<commit_message>
Updated the network map
</commit_message>
<xml_diff>
--- a/img/volciclab_network.pptx
+++ b/img/volciclab_network.pptx
@@ -261,7 +261,7 @@
           <a:p>
             <a:fld id="{BCBE9AB7-E685-784A-BE37-C84773150D37}" type="datetimeFigureOut">
               <a:rPr lang="hu-AE" smtClean="0"/>
-              <a:t>08/03/2022</a:t>
+              <a:t>08/31/2023</a:t>
             </a:fld>
             <a:endParaRPr lang="hu-AE"/>
           </a:p>
@@ -461,7 +461,7 @@
           <a:p>
             <a:fld id="{BCBE9AB7-E685-784A-BE37-C84773150D37}" type="datetimeFigureOut">
               <a:rPr lang="hu-AE" smtClean="0"/>
-              <a:t>08/03/2022</a:t>
+              <a:t>08/31/2023</a:t>
             </a:fld>
             <a:endParaRPr lang="hu-AE"/>
           </a:p>
@@ -671,7 +671,7 @@
           <a:p>
             <a:fld id="{BCBE9AB7-E685-784A-BE37-C84773150D37}" type="datetimeFigureOut">
               <a:rPr lang="hu-AE" smtClean="0"/>
-              <a:t>08/03/2022</a:t>
+              <a:t>08/31/2023</a:t>
             </a:fld>
             <a:endParaRPr lang="hu-AE"/>
           </a:p>
@@ -871,7 +871,7 @@
           <a:p>
             <a:fld id="{BCBE9AB7-E685-784A-BE37-C84773150D37}" type="datetimeFigureOut">
               <a:rPr lang="hu-AE" smtClean="0"/>
-              <a:t>08/03/2022</a:t>
+              <a:t>08/31/2023</a:t>
             </a:fld>
             <a:endParaRPr lang="hu-AE"/>
           </a:p>
@@ -1147,7 +1147,7 @@
           <a:p>
             <a:fld id="{BCBE9AB7-E685-784A-BE37-C84773150D37}" type="datetimeFigureOut">
               <a:rPr lang="hu-AE" smtClean="0"/>
-              <a:t>08/03/2022</a:t>
+              <a:t>08/31/2023</a:t>
             </a:fld>
             <a:endParaRPr lang="hu-AE"/>
           </a:p>
@@ -1415,7 +1415,7 @@
           <a:p>
             <a:fld id="{BCBE9AB7-E685-784A-BE37-C84773150D37}" type="datetimeFigureOut">
               <a:rPr lang="hu-AE" smtClean="0"/>
-              <a:t>08/03/2022</a:t>
+              <a:t>08/31/2023</a:t>
             </a:fld>
             <a:endParaRPr lang="hu-AE"/>
           </a:p>
@@ -1830,7 +1830,7 @@
           <a:p>
             <a:fld id="{BCBE9AB7-E685-784A-BE37-C84773150D37}" type="datetimeFigureOut">
               <a:rPr lang="hu-AE" smtClean="0"/>
-              <a:t>08/03/2022</a:t>
+              <a:t>08/31/2023</a:t>
             </a:fld>
             <a:endParaRPr lang="hu-AE"/>
           </a:p>
@@ -1972,7 +1972,7 @@
           <a:p>
             <a:fld id="{BCBE9AB7-E685-784A-BE37-C84773150D37}" type="datetimeFigureOut">
               <a:rPr lang="hu-AE" smtClean="0"/>
-              <a:t>08/03/2022</a:t>
+              <a:t>08/31/2023</a:t>
             </a:fld>
             <a:endParaRPr lang="hu-AE"/>
           </a:p>
@@ -2085,7 +2085,7 @@
           <a:p>
             <a:fld id="{BCBE9AB7-E685-784A-BE37-C84773150D37}" type="datetimeFigureOut">
               <a:rPr lang="hu-AE" smtClean="0"/>
-              <a:t>08/03/2022</a:t>
+              <a:t>08/31/2023</a:t>
             </a:fld>
             <a:endParaRPr lang="hu-AE"/>
           </a:p>
@@ -2398,7 +2398,7 @@
           <a:p>
             <a:fld id="{BCBE9AB7-E685-784A-BE37-C84773150D37}" type="datetimeFigureOut">
               <a:rPr lang="hu-AE" smtClean="0"/>
-              <a:t>08/03/2022</a:t>
+              <a:t>08/31/2023</a:t>
             </a:fld>
             <a:endParaRPr lang="hu-AE"/>
           </a:p>
@@ -2687,7 +2687,7 @@
           <a:p>
             <a:fld id="{BCBE9AB7-E685-784A-BE37-C84773150D37}" type="datetimeFigureOut">
               <a:rPr lang="hu-AE" smtClean="0"/>
-              <a:t>08/03/2022</a:t>
+              <a:t>08/31/2023</a:t>
             </a:fld>
             <a:endParaRPr lang="hu-AE"/>
           </a:p>
@@ -2930,7 +2930,7 @@
           <a:p>
             <a:fld id="{BCBE9AB7-E685-784A-BE37-C84773150D37}" type="datetimeFigureOut">
               <a:rPr lang="hu-AE" smtClean="0"/>
-              <a:t>08/03/2022</a:t>
+              <a:t>08/31/2023</a:t>
             </a:fld>
             <a:endParaRPr lang="hu-AE"/>
           </a:p>
@@ -3349,10 +3349,10 @@
       </p:grpSpPr>
       <p:pic>
         <p:nvPicPr>
-          <p:cNvPr id="36" name="Kép 35">
-            <a:extLst>
-              <a:ext uri="{FF2B5EF4-FFF2-40B4-BE49-F238E27FC236}">
-                <a16:creationId xmlns:a16="http://schemas.microsoft.com/office/drawing/2014/main" id="{94FDF25C-E1B9-0A4D-9CD6-AFEEAF3BC13A}"/>
+          <p:cNvPr id="43" name="Kép 42" descr="A képen elektronika, Elektronikus eszköz, Hangszóróláda, hangszóró látható&#10;&#10;Automatikusan generált leírás">
+            <a:extLst>
+              <a:ext uri="{FF2B5EF4-FFF2-40B4-BE49-F238E27FC236}">
+                <a16:creationId xmlns:a16="http://schemas.microsoft.com/office/drawing/2014/main" id="{32698ED9-BA41-9743-ABAD-E7E2E37CB46A}"/>
               </a:ext>
             </a:extLst>
           </p:cNvPr>
@@ -3369,8 +3369,8 @@
         </p:blipFill>
         <p:spPr>
           <a:xfrm>
-            <a:off x="9491678" y="1715688"/>
-            <a:ext cx="1377863" cy="1377863"/>
+            <a:off x="9014797" y="3834580"/>
+            <a:ext cx="870679" cy="1362802"/>
           </a:xfrm>
           <a:prstGeom prst="rect">
             <a:avLst/>
@@ -3379,10 +3379,10 @@
       </p:pic>
       <p:pic>
         <p:nvPicPr>
-          <p:cNvPr id="30" name="Kép 29">
-            <a:extLst>
-              <a:ext uri="{FF2B5EF4-FFF2-40B4-BE49-F238E27FC236}">
-                <a16:creationId xmlns:a16="http://schemas.microsoft.com/office/drawing/2014/main" id="{020B1EF8-4B06-4E43-8496-18460FD48535}"/>
+          <p:cNvPr id="3" name="Kép 2" descr="A képen elektronika, Elektronikus eszköz, erősítő látható&#10;&#10;Automatikusan generált leírás">
+            <a:extLst>
+              <a:ext uri="{FF2B5EF4-FFF2-40B4-BE49-F238E27FC236}">
+                <a16:creationId xmlns:a16="http://schemas.microsoft.com/office/drawing/2014/main" id="{8F73906C-96CF-A285-24DC-6D768ECD4E3C}"/>
               </a:ext>
             </a:extLst>
           </p:cNvPr>
@@ -3399,20 +3399,138 @@
         </p:blipFill>
         <p:spPr>
           <a:xfrm>
-            <a:off x="8728696" y="618053"/>
-            <a:ext cx="1709058" cy="1281794"/>
+            <a:off x="8289876" y="2118659"/>
+            <a:ext cx="2181145" cy="739530"/>
           </a:xfrm>
           <a:prstGeom prst="rect">
             <a:avLst/>
           </a:prstGeom>
         </p:spPr>
       </p:pic>
+      <p:grpSp>
+        <p:nvGrpSpPr>
+          <p:cNvPr id="9" name="Csoportba foglalás 8">
+            <a:extLst>
+              <a:ext uri="{FF2B5EF4-FFF2-40B4-BE49-F238E27FC236}">
+                <a16:creationId xmlns:a16="http://schemas.microsoft.com/office/drawing/2014/main" id="{15DD8B49-4A42-F56E-68AA-A44420745ECF}"/>
+              </a:ext>
+            </a:extLst>
+          </p:cNvPr>
+          <p:cNvGrpSpPr/>
+          <p:nvPr/>
+        </p:nvGrpSpPr>
+        <p:grpSpPr>
+          <a:xfrm>
+            <a:off x="7468513" y="5183437"/>
+            <a:ext cx="2973595" cy="1692126"/>
+            <a:chOff x="8544613" y="4901371"/>
+            <a:chExt cx="2973595" cy="1692126"/>
+          </a:xfrm>
+        </p:grpSpPr>
+        <p:pic>
+          <p:nvPicPr>
+            <p:cNvPr id="39" name="Kép 38">
+              <a:extLst>
+                <a:ext uri="{FF2B5EF4-FFF2-40B4-BE49-F238E27FC236}">
+                  <a16:creationId xmlns:a16="http://schemas.microsoft.com/office/drawing/2014/main" id="{BC565AC3-EA26-4049-AD88-1DFE23AA8950}"/>
+                </a:ext>
+              </a:extLst>
+            </p:cNvPr>
+            <p:cNvPicPr>
+              <a:picLocks noChangeAspect="1"/>
+            </p:cNvPicPr>
+            <p:nvPr/>
+          </p:nvPicPr>
+          <p:blipFill>
+            <a:blip r:embed="rId4"/>
+            <a:stretch>
+              <a:fillRect/>
+            </a:stretch>
+          </p:blipFill>
+          <p:spPr>
+            <a:xfrm>
+              <a:off x="8544613" y="4901371"/>
+              <a:ext cx="1310568" cy="1692126"/>
+            </a:xfrm>
+            <a:prstGeom prst="rect">
+              <a:avLst/>
+            </a:prstGeom>
+          </p:spPr>
+        </p:pic>
+        <p:sp>
+          <p:nvSpPr>
+            <p:cNvPr id="42" name="Szövegdoboz 41">
+              <a:extLst>
+                <a:ext uri="{FF2B5EF4-FFF2-40B4-BE49-F238E27FC236}">
+                  <a16:creationId xmlns:a16="http://schemas.microsoft.com/office/drawing/2014/main" id="{A89E5010-4815-0A42-9A84-8F76F1D8955E}"/>
+                </a:ext>
+              </a:extLst>
+            </p:cNvPr>
+            <p:cNvSpPr txBox="1"/>
+            <p:nvPr/>
+          </p:nvSpPr>
+          <p:spPr>
+            <a:xfrm>
+              <a:off x="9791847" y="4901371"/>
+              <a:ext cx="1726361" cy="1261884"/>
+            </a:xfrm>
+            <a:prstGeom prst="rect">
+              <a:avLst/>
+            </a:prstGeom>
+            <a:noFill/>
+          </p:spPr>
+          <p:txBody>
+            <a:bodyPr wrap="square" rtlCol="0">
+              <a:spAutoFit/>
+            </a:bodyPr>
+            <a:lstStyle/>
+            <a:p>
+              <a:r>
+                <a:rPr lang="hu-AE" dirty="0"/>
+                <a:t>Volciclab </a:t>
+              </a:r>
+              <a:r>
+                <a:rPr lang="hu-HU" dirty="0"/>
+                <a:t>Server</a:t>
+              </a:r>
+              <a:endParaRPr lang="hu-AE" dirty="0"/>
+            </a:p>
+            <a:p>
+              <a:r>
+                <a:rPr lang="hu-HU" sz="1100" dirty="0"/>
+                <a:t>File server and</a:t>
+              </a:r>
+              <a:br>
+                <a:rPr lang="hu-HU" sz="1100" dirty="0"/>
+              </a:br>
+              <a:r>
+                <a:rPr lang="hu-HU" sz="1100" dirty="0"/>
+                <a:t>Google Drive </a:t>
+              </a:r>
+              <a:r>
+                <a:rPr lang="hu-HU" sz="1100" dirty="0" err="1"/>
+                <a:t>sync</a:t>
+              </a:r>
+              <a:endParaRPr lang="hu-HU" sz="1100" dirty="0"/>
+            </a:p>
+            <a:p>
+              <a:r>
+                <a:rPr lang="hu-AE" dirty="0"/>
+                <a:t>192.168.42.7</a:t>
+              </a:r>
+            </a:p>
+            <a:p>
+              <a:endParaRPr lang="hu-AE" dirty="0"/>
+            </a:p>
+          </p:txBody>
+        </p:sp>
+      </p:grpSp>
       <p:pic>
         <p:nvPicPr>
-          <p:cNvPr id="10" name="Kép 9">
-            <a:extLst>
-              <a:ext uri="{FF2B5EF4-FFF2-40B4-BE49-F238E27FC236}">
-                <a16:creationId xmlns:a16="http://schemas.microsoft.com/office/drawing/2014/main" id="{264FCEB7-DD5D-5A40-8795-15FDF29F461E}"/>
+          <p:cNvPr id="30" name="Kép 29">
+            <a:extLst>
+              <a:ext uri="{FF2B5EF4-FFF2-40B4-BE49-F238E27FC236}">
+                <a16:creationId xmlns:a16="http://schemas.microsoft.com/office/drawing/2014/main" id="{020B1EF8-4B06-4E43-8496-18460FD48535}"/>
               </a:ext>
             </a:extLst>
           </p:cNvPr>
@@ -3422,7 +3540,37 @@
           <p:nvPr/>
         </p:nvPicPr>
         <p:blipFill>
-          <a:blip r:embed="rId4"/>
+          <a:blip r:embed="rId5"/>
+          <a:stretch>
+            <a:fillRect/>
+          </a:stretch>
+        </p:blipFill>
+        <p:spPr>
+          <a:xfrm>
+            <a:off x="8728696" y="618053"/>
+            <a:ext cx="1709058" cy="1281794"/>
+          </a:xfrm>
+          <a:prstGeom prst="rect">
+            <a:avLst/>
+          </a:prstGeom>
+        </p:spPr>
+      </p:pic>
+      <p:pic>
+        <p:nvPicPr>
+          <p:cNvPr id="10" name="Kép 9">
+            <a:extLst>
+              <a:ext uri="{FF2B5EF4-FFF2-40B4-BE49-F238E27FC236}">
+                <a16:creationId xmlns:a16="http://schemas.microsoft.com/office/drawing/2014/main" id="{264FCEB7-DD5D-5A40-8795-15FDF29F461E}"/>
+              </a:ext>
+            </a:extLst>
+          </p:cNvPr>
+          <p:cNvPicPr>
+            <a:picLocks noChangeAspect="1"/>
+          </p:cNvPicPr>
+          <p:nvPr/>
+        </p:nvPicPr>
+        <p:blipFill>
+          <a:blip r:embed="rId6"/>
           <a:stretch>
             <a:fillRect/>
           </a:stretch>
@@ -3549,7 +3697,7 @@
             <p:nvPr/>
           </p:nvPicPr>
           <p:blipFill>
-            <a:blip r:embed="rId5"/>
+            <a:blip r:embed="rId7"/>
             <a:stretch>
               <a:fillRect/>
             </a:stretch>
@@ -3699,7 +3847,7 @@
           <p:nvPr/>
         </p:nvPicPr>
         <p:blipFill>
-          <a:blip r:embed="rId6"/>
+          <a:blip r:embed="rId8"/>
           <a:stretch>
             <a:fillRect/>
           </a:stretch>
@@ -3729,7 +3877,7 @@
           <p:nvPr/>
         </p:nvPicPr>
         <p:blipFill>
-          <a:blip r:embed="rId6"/>
+          <a:blip r:embed="rId8"/>
           <a:stretch>
             <a:fillRect/>
           </a:stretch>
@@ -3759,7 +3907,7 @@
           <p:nvPr/>
         </p:nvPicPr>
         <p:blipFill>
-          <a:blip r:embed="rId6"/>
+          <a:blip r:embed="rId8"/>
           <a:stretch>
             <a:fillRect/>
           </a:stretch>
@@ -3789,7 +3937,7 @@
           <p:nvPr/>
         </p:nvPicPr>
         <p:blipFill>
-          <a:blip r:embed="rId6"/>
+          <a:blip r:embed="rId8"/>
           <a:stretch>
             <a:fillRect/>
           </a:stretch>
@@ -3819,7 +3967,7 @@
           <p:nvPr/>
         </p:nvPicPr>
         <p:blipFill>
-          <a:blip r:embed="rId6"/>
+          <a:blip r:embed="rId8"/>
           <a:stretch>
             <a:fillRect/>
           </a:stretch>
@@ -3984,7 +4132,7 @@
           <p:nvPr/>
         </p:nvPicPr>
         <p:blipFill>
-          <a:blip r:embed="rId7"/>
+          <a:blip r:embed="rId9"/>
           <a:stretch>
             <a:fillRect/>
           </a:stretch>
@@ -4268,8 +4416,8 @@
         </p:nvSpPr>
         <p:spPr>
           <a:xfrm>
-            <a:off x="10039487" y="2755453"/>
-            <a:ext cx="1111202" cy="261610"/>
+            <a:off x="10378183" y="2063583"/>
+            <a:ext cx="997389" cy="261610"/>
           </a:xfrm>
           <a:prstGeom prst="rect">
             <a:avLst/>
@@ -4283,122 +4431,117 @@
           <a:lstStyle/>
           <a:p>
             <a:r>
+              <a:rPr lang="hu-HU" sz="1100" dirty="0"/>
+              <a:t>TP-Link</a:t>
+            </a:r>
+            <a:r>
               <a:rPr lang="hu-AE" sz="1100" dirty="0"/>
-              <a:t>Trendnet switch</a:t>
-            </a:r>
-          </a:p>
-        </p:txBody>
-      </p:sp>
-      <p:pic>
-        <p:nvPicPr>
-          <p:cNvPr id="39" name="Kép 38">
-            <a:extLst>
-              <a:ext uri="{FF2B5EF4-FFF2-40B4-BE49-F238E27FC236}">
-                <a16:creationId xmlns:a16="http://schemas.microsoft.com/office/drawing/2014/main" id="{BC565AC3-EA26-4049-AD88-1DFE23AA8950}"/>
-              </a:ext>
-            </a:extLst>
-          </p:cNvPr>
-          <p:cNvPicPr>
-            <a:picLocks noChangeAspect="1"/>
-          </p:cNvPicPr>
+              <a:t> switch</a:t>
+            </a:r>
+          </a:p>
+        </p:txBody>
+      </p:sp>
+      <p:grpSp>
+        <p:nvGrpSpPr>
+          <p:cNvPr id="5" name="Csoportba foglalás 4">
+            <a:extLst>
+              <a:ext uri="{FF2B5EF4-FFF2-40B4-BE49-F238E27FC236}">
+                <a16:creationId xmlns:a16="http://schemas.microsoft.com/office/drawing/2014/main" id="{1C5B823B-379C-1628-C2B6-E6FEC42A9CF2}"/>
+              </a:ext>
+            </a:extLst>
+          </p:cNvPr>
+          <p:cNvGrpSpPr/>
           <p:nvPr/>
-        </p:nvPicPr>
-        <p:blipFill>
-          <a:blip r:embed="rId8"/>
-          <a:stretch>
-            <a:fillRect/>
-          </a:stretch>
-        </p:blipFill>
-        <p:spPr>
+        </p:nvGrpSpPr>
+        <p:grpSpPr>
           <a:xfrm>
-            <a:off x="8544613" y="4901371"/>
-            <a:ext cx="1310568" cy="1692126"/>
-          </a:xfrm>
-          <a:prstGeom prst="rect">
-            <a:avLst/>
-          </a:prstGeom>
-        </p:spPr>
-      </p:pic>
-      <p:pic>
-        <p:nvPicPr>
-          <p:cNvPr id="40" name="Kép 39">
-            <a:extLst>
-              <a:ext uri="{FF2B5EF4-FFF2-40B4-BE49-F238E27FC236}">
-                <a16:creationId xmlns:a16="http://schemas.microsoft.com/office/drawing/2014/main" id="{2D3401BA-512C-2149-86EC-0B08F1A4E061}"/>
-              </a:ext>
-            </a:extLst>
-          </p:cNvPr>
-          <p:cNvPicPr>
-            <a:picLocks noChangeAspect="1"/>
-          </p:cNvPicPr>
-          <p:nvPr/>
-        </p:nvPicPr>
-        <p:blipFill>
-          <a:blip r:embed="rId8"/>
-          <a:stretch>
-            <a:fillRect/>
-          </a:stretch>
-        </p:blipFill>
-        <p:spPr>
-          <a:xfrm>
-            <a:off x="5273193" y="4901371"/>
-            <a:ext cx="1310568" cy="1692126"/>
-          </a:xfrm>
-          <a:prstGeom prst="rect">
-            <a:avLst/>
-          </a:prstGeom>
-        </p:spPr>
-      </p:pic>
-      <p:sp>
-        <p:nvSpPr>
-          <p:cNvPr id="41" name="Szövegdoboz 40">
-            <a:extLst>
-              <a:ext uri="{FF2B5EF4-FFF2-40B4-BE49-F238E27FC236}">
-                <a16:creationId xmlns:a16="http://schemas.microsoft.com/office/drawing/2014/main" id="{B8EA958D-FAA9-864C-A07E-113FCAE546F1}"/>
-              </a:ext>
-            </a:extLst>
-          </p:cNvPr>
-          <p:cNvSpPr txBox="1"/>
-          <p:nvPr/>
-        </p:nvSpPr>
-        <p:spPr>
-          <a:xfrm>
-            <a:off x="6501209" y="4938574"/>
-            <a:ext cx="1708469" cy="1092607"/>
-          </a:xfrm>
-          <a:prstGeom prst="rect">
-            <a:avLst/>
-          </a:prstGeom>
-          <a:noFill/>
-        </p:spPr>
-        <p:txBody>
-          <a:bodyPr wrap="square" rtlCol="0">
-            <a:spAutoFit/>
-          </a:bodyPr>
-          <a:lstStyle/>
-          <a:p>
-            <a:r>
-              <a:rPr lang="hu-AE" dirty="0"/>
-              <a:t>Volciclab 1</a:t>
-            </a:r>
-          </a:p>
-          <a:p>
-            <a:r>
-              <a:rPr lang="hu-AE" sz="1100" dirty="0"/>
-              <a:t>Experimental computer</a:t>
-            </a:r>
-          </a:p>
-          <a:p>
-            <a:r>
-              <a:rPr lang="hu-AE" dirty="0"/>
-              <a:t>192.168.42.6</a:t>
-            </a:r>
-          </a:p>
-          <a:p>
-            <a:endParaRPr lang="hu-AE" dirty="0"/>
-          </a:p>
-        </p:txBody>
-      </p:sp>
+            <a:off x="4994179" y="4849149"/>
+            <a:ext cx="2936485" cy="1692126"/>
+            <a:chOff x="5273193" y="4901371"/>
+            <a:chExt cx="2936485" cy="1692126"/>
+          </a:xfrm>
+        </p:grpSpPr>
+        <p:pic>
+          <p:nvPicPr>
+            <p:cNvPr id="40" name="Kép 39">
+              <a:extLst>
+                <a:ext uri="{FF2B5EF4-FFF2-40B4-BE49-F238E27FC236}">
+                  <a16:creationId xmlns:a16="http://schemas.microsoft.com/office/drawing/2014/main" id="{2D3401BA-512C-2149-86EC-0B08F1A4E061}"/>
+                </a:ext>
+              </a:extLst>
+            </p:cNvPr>
+            <p:cNvPicPr>
+              <a:picLocks noChangeAspect="1"/>
+            </p:cNvPicPr>
+            <p:nvPr/>
+          </p:nvPicPr>
+          <p:blipFill>
+            <a:blip r:embed="rId4"/>
+            <a:stretch>
+              <a:fillRect/>
+            </a:stretch>
+          </p:blipFill>
+          <p:spPr>
+            <a:xfrm>
+              <a:off x="5273193" y="4901371"/>
+              <a:ext cx="1310568" cy="1692126"/>
+            </a:xfrm>
+            <a:prstGeom prst="rect">
+              <a:avLst/>
+            </a:prstGeom>
+          </p:spPr>
+        </p:pic>
+        <p:sp>
+          <p:nvSpPr>
+            <p:cNvPr id="41" name="Szövegdoboz 40">
+              <a:extLst>
+                <a:ext uri="{FF2B5EF4-FFF2-40B4-BE49-F238E27FC236}">
+                  <a16:creationId xmlns:a16="http://schemas.microsoft.com/office/drawing/2014/main" id="{B8EA958D-FAA9-864C-A07E-113FCAE546F1}"/>
+                </a:ext>
+              </a:extLst>
+            </p:cNvPr>
+            <p:cNvSpPr txBox="1"/>
+            <p:nvPr/>
+          </p:nvSpPr>
+          <p:spPr>
+            <a:xfrm>
+              <a:off x="6501209" y="4938574"/>
+              <a:ext cx="1708469" cy="1092607"/>
+            </a:xfrm>
+            <a:prstGeom prst="rect">
+              <a:avLst/>
+            </a:prstGeom>
+            <a:noFill/>
+          </p:spPr>
+          <p:txBody>
+            <a:bodyPr wrap="square" rtlCol="0">
+              <a:spAutoFit/>
+            </a:bodyPr>
+            <a:lstStyle/>
+            <a:p>
+              <a:r>
+                <a:rPr lang="hu-AE" dirty="0"/>
+                <a:t>Volciclab 1</a:t>
+              </a:r>
+            </a:p>
+            <a:p>
+              <a:r>
+                <a:rPr lang="hu-AE" sz="1100" dirty="0"/>
+                <a:t>Experimental computer</a:t>
+              </a:r>
+            </a:p>
+            <a:p>
+              <a:r>
+                <a:rPr lang="hu-AE" dirty="0"/>
+                <a:t>192.168.42.6</a:t>
+              </a:r>
+            </a:p>
+            <a:p>
+              <a:endParaRPr lang="hu-AE" dirty="0"/>
+            </a:p>
+          </p:txBody>
+        </p:sp>
+      </p:grpSp>
       <p:cxnSp>
         <p:nvCxnSpPr>
           <p:cNvPr id="44" name="Egyenes összekötő 43">
@@ -4587,15 +4730,13 @@
           </p:cNvPr>
           <p:cNvCxnSpPr>
             <a:cxnSpLocks/>
-            <a:stCxn id="36" idx="1"/>
-            <a:endCxn id="32" idx="3"/>
           </p:cNvCxnSpPr>
           <p:nvPr/>
         </p:nvCxnSpPr>
         <p:spPr>
           <a:xfrm flipH="1" flipV="1">
-            <a:off x="6419950" y="1873007"/>
-            <a:ext cx="3071728" cy="531613"/>
+            <a:off x="6536936" y="1810633"/>
+            <a:ext cx="3343522" cy="670573"/>
           </a:xfrm>
           <a:prstGeom prst="line">
             <a:avLst/>
@@ -4720,18 +4861,17 @@
           </p:cNvPr>
           <p:cNvCxnSpPr>
             <a:cxnSpLocks/>
+            <a:stCxn id="40" idx="0"/>
           </p:cNvCxnSpPr>
           <p:nvPr/>
         </p:nvCxnSpPr>
         <p:spPr>
-          <a:xfrm flipV="1">
-            <a:off x="6176065" y="4353580"/>
-            <a:ext cx="2448105" cy="637289"/>
-          </a:xfrm>
-          <a:prstGeom prst="bentConnector3">
-            <a:avLst>
-              <a:gd name="adj1" fmla="val -143"/>
-            </a:avLst>
+          <a:xfrm rot="5400000" flipH="1" flipV="1">
+            <a:off x="6893428" y="3109616"/>
+            <a:ext cx="495568" cy="2983498"/>
+          </a:xfrm>
+          <a:prstGeom prst="bentConnector2">
+            <a:avLst/>
           </a:prstGeom>
           <a:ln w="12700">
             <a:solidFill>
@@ -4770,8 +4910,8 @@
         </p:nvCxnSpPr>
         <p:spPr>
           <a:xfrm flipV="1">
-            <a:off x="8624170" y="2712284"/>
-            <a:ext cx="1327759" cy="1641296"/>
+            <a:off x="8624170" y="2593973"/>
+            <a:ext cx="1256288" cy="1759607"/>
           </a:xfrm>
           <a:prstGeom prst="line">
             <a:avLst/>
@@ -4806,13 +4946,16 @@
               </a:ext>
             </a:extLst>
           </p:cNvPr>
-          <p:cNvCxnSpPr/>
+          <p:cNvCxnSpPr>
+            <a:cxnSpLocks/>
+            <a:stCxn id="39" idx="0"/>
+          </p:cNvCxnSpPr>
           <p:nvPr/>
         </p:nvCxnSpPr>
         <p:spPr>
           <a:xfrm flipV="1">
-            <a:off x="9338153" y="2701019"/>
-            <a:ext cx="745299" cy="2289849"/>
+            <a:off x="8123797" y="2586641"/>
+            <a:ext cx="1844752" cy="2596796"/>
           </a:xfrm>
           <a:prstGeom prst="line">
             <a:avLst/>
@@ -4943,13 +5086,15 @@
               </a:ext>
             </a:extLst>
           </p:cNvPr>
-          <p:cNvCxnSpPr/>
+          <p:cNvCxnSpPr>
+            <a:cxnSpLocks/>
+          </p:cNvCxnSpPr>
           <p:nvPr/>
         </p:nvCxnSpPr>
         <p:spPr>
           <a:xfrm>
             <a:off x="9645041" y="1899847"/>
-            <a:ext cx="210140" cy="305873"/>
+            <a:ext cx="336623" cy="553160"/>
           </a:xfrm>
           <a:prstGeom prst="line">
             <a:avLst/>
@@ -5001,7 +5146,646 @@
                 <a:lumMod val="75000"/>
               </a:schemeClr>
             </a:solidFill>
-            <a:prstDash val="lgDash"/>
+            <a:prstDash val="solid"/>
+          </a:ln>
+        </p:spPr>
+        <p:style>
+          <a:lnRef idx="1">
+            <a:schemeClr val="accent1"/>
+          </a:lnRef>
+          <a:fillRef idx="0">
+            <a:schemeClr val="accent1"/>
+          </a:fillRef>
+          <a:effectRef idx="0">
+            <a:schemeClr val="accent1"/>
+          </a:effectRef>
+          <a:fontRef idx="minor">
+            <a:schemeClr val="tx1"/>
+          </a:fontRef>
+        </p:style>
+      </p:cxnSp>
+      <p:sp>
+        <p:nvSpPr>
+          <p:cNvPr id="93" name="Szövegdoboz 92">
+            <a:extLst>
+              <a:ext uri="{FF2B5EF4-FFF2-40B4-BE49-F238E27FC236}">
+                <a16:creationId xmlns:a16="http://schemas.microsoft.com/office/drawing/2014/main" id="{A30FF902-041F-594E-A260-BC659D11C908}"/>
+              </a:ext>
+            </a:extLst>
+          </p:cNvPr>
+          <p:cNvSpPr txBox="1"/>
+          <p:nvPr/>
+        </p:nvSpPr>
+        <p:spPr>
+          <a:xfrm rot="16200000">
+            <a:off x="5209995" y="4478255"/>
+            <a:ext cx="736099" cy="246221"/>
+          </a:xfrm>
+          <a:prstGeom prst="rect">
+            <a:avLst/>
+          </a:prstGeom>
+          <a:noFill/>
+        </p:spPr>
+        <p:txBody>
+          <a:bodyPr wrap="none" rtlCol="0">
+            <a:spAutoFit/>
+          </a:bodyPr>
+          <a:lstStyle/>
+          <a:p>
+            <a:r>
+              <a:rPr lang="hu-AE" sz="1000" dirty="0"/>
+              <a:t>Ethernet 1</a:t>
+            </a:r>
+          </a:p>
+        </p:txBody>
+      </p:sp>
+      <p:sp>
+        <p:nvSpPr>
+          <p:cNvPr id="94" name="Szövegdoboz 93">
+            <a:extLst>
+              <a:ext uri="{FF2B5EF4-FFF2-40B4-BE49-F238E27FC236}">
+                <a16:creationId xmlns:a16="http://schemas.microsoft.com/office/drawing/2014/main" id="{13418819-1647-1842-A2F0-E6AE8629D704}"/>
+              </a:ext>
+            </a:extLst>
+          </p:cNvPr>
+          <p:cNvSpPr txBox="1"/>
+          <p:nvPr/>
+        </p:nvSpPr>
+        <p:spPr>
+          <a:xfrm rot="18341014">
+            <a:off x="7808268" y="4838061"/>
+            <a:ext cx="736099" cy="246221"/>
+          </a:xfrm>
+          <a:prstGeom prst="rect">
+            <a:avLst/>
+          </a:prstGeom>
+          <a:noFill/>
+        </p:spPr>
+        <p:txBody>
+          <a:bodyPr wrap="none" rtlCol="0">
+            <a:spAutoFit/>
+          </a:bodyPr>
+          <a:lstStyle/>
+          <a:p>
+            <a:r>
+              <a:rPr lang="hu-AE" sz="1000" dirty="0"/>
+              <a:t>Ethernet 1</a:t>
+            </a:r>
+          </a:p>
+        </p:txBody>
+      </p:sp>
+      <p:sp>
+        <p:nvSpPr>
+          <p:cNvPr id="102" name="Téglalap 101">
+            <a:extLst>
+              <a:ext uri="{FF2B5EF4-FFF2-40B4-BE49-F238E27FC236}">
+                <a16:creationId xmlns:a16="http://schemas.microsoft.com/office/drawing/2014/main" id="{8818C8ED-0F3A-5F4D-8A08-9E0C99BA32DE}"/>
+              </a:ext>
+            </a:extLst>
+          </p:cNvPr>
+          <p:cNvSpPr/>
+          <p:nvPr/>
+        </p:nvSpPr>
+        <p:spPr>
+          <a:xfrm>
+            <a:off x="76944" y="590230"/>
+            <a:ext cx="5029413" cy="5960790"/>
+          </a:xfrm>
+          <a:prstGeom prst="rect">
+            <a:avLst/>
+          </a:prstGeom>
+          <a:noFill/>
+          <a:ln w="28575">
+            <a:solidFill>
+              <a:srgbClr val="00B0F0"/>
+            </a:solidFill>
+          </a:ln>
+        </p:spPr>
+        <p:style>
+          <a:lnRef idx="2">
+            <a:schemeClr val="accent1">
+              <a:shade val="50000"/>
+            </a:schemeClr>
+          </a:lnRef>
+          <a:fillRef idx="1">
+            <a:schemeClr val="accent1"/>
+          </a:fillRef>
+          <a:effectRef idx="0">
+            <a:schemeClr val="accent1"/>
+          </a:effectRef>
+          <a:fontRef idx="minor">
+            <a:schemeClr val="lt1"/>
+          </a:fontRef>
+        </p:style>
+        <p:txBody>
+          <a:bodyPr rtlCol="0" anchor="ctr"/>
+          <a:lstStyle/>
+          <a:p>
+            <a:pPr algn="ctr"/>
+            <a:endParaRPr lang="hu-AE"/>
+          </a:p>
+        </p:txBody>
+      </p:sp>
+      <p:sp>
+        <p:nvSpPr>
+          <p:cNvPr id="32" name="Szövegdoboz 31">
+            <a:extLst>
+              <a:ext uri="{FF2B5EF4-FFF2-40B4-BE49-F238E27FC236}">
+                <a16:creationId xmlns:a16="http://schemas.microsoft.com/office/drawing/2014/main" id="{3FBDDDB9-5398-5D41-8FDE-DB176EDF5931}"/>
+              </a:ext>
+            </a:extLst>
+          </p:cNvPr>
+          <p:cNvSpPr txBox="1"/>
+          <p:nvPr/>
+        </p:nvSpPr>
+        <p:spPr>
+          <a:xfrm>
+            <a:off x="5008986" y="1519064"/>
+            <a:ext cx="1410964" cy="707886"/>
+          </a:xfrm>
+          <a:prstGeom prst="rect">
+            <a:avLst/>
+          </a:prstGeom>
+          <a:noFill/>
+        </p:spPr>
+        <p:txBody>
+          <a:bodyPr wrap="none" rtlCol="0">
+            <a:spAutoFit/>
+          </a:bodyPr>
+          <a:lstStyle/>
+          <a:p>
+            <a:pPr algn="r"/>
+            <a:r>
+              <a:rPr lang="hu-AE" sz="1100" dirty="0"/>
+              <a:t>OptiTrack computer</a:t>
+            </a:r>
+          </a:p>
+          <a:p>
+            <a:pPr algn="r"/>
+            <a:r>
+              <a:rPr lang="hu-AE" sz="1100" dirty="0"/>
+              <a:t>Volciclab network</a:t>
+            </a:r>
+          </a:p>
+          <a:p>
+            <a:pPr algn="r"/>
+            <a:r>
+              <a:rPr lang="hu-AE" dirty="0"/>
+              <a:t>192.168.42.5</a:t>
+            </a:r>
+          </a:p>
+        </p:txBody>
+      </p:sp>
+      <p:sp>
+        <p:nvSpPr>
+          <p:cNvPr id="103" name="Téglalap 102">
+            <a:extLst>
+              <a:ext uri="{FF2B5EF4-FFF2-40B4-BE49-F238E27FC236}">
+                <a16:creationId xmlns:a16="http://schemas.microsoft.com/office/drawing/2014/main" id="{8BA67D5F-C9DF-484B-8FB7-06AFBEA157A7}"/>
+              </a:ext>
+            </a:extLst>
+          </p:cNvPr>
+          <p:cNvSpPr/>
+          <p:nvPr/>
+        </p:nvSpPr>
+        <p:spPr>
+          <a:xfrm>
+            <a:off x="3555551" y="531178"/>
+            <a:ext cx="8067826" cy="6150975"/>
+          </a:xfrm>
+          <a:prstGeom prst="rect">
+            <a:avLst/>
+          </a:prstGeom>
+          <a:noFill/>
+          <a:ln w="28575">
+            <a:solidFill>
+              <a:schemeClr val="tx1"/>
+            </a:solidFill>
+          </a:ln>
+        </p:spPr>
+        <p:style>
+          <a:lnRef idx="2">
+            <a:schemeClr val="accent1">
+              <a:shade val="50000"/>
+            </a:schemeClr>
+          </a:lnRef>
+          <a:fillRef idx="1">
+            <a:schemeClr val="accent1"/>
+          </a:fillRef>
+          <a:effectRef idx="0">
+            <a:schemeClr val="accent1"/>
+          </a:effectRef>
+          <a:fontRef idx="minor">
+            <a:schemeClr val="lt1"/>
+          </a:fontRef>
+        </p:style>
+        <p:txBody>
+          <a:bodyPr rtlCol="0" anchor="ctr"/>
+          <a:lstStyle/>
+          <a:p>
+            <a:pPr algn="ctr"/>
+            <a:endParaRPr lang="hu-AE"/>
+          </a:p>
+        </p:txBody>
+      </p:sp>
+      <p:sp>
+        <p:nvSpPr>
+          <p:cNvPr id="104" name="Szövegdoboz 103">
+            <a:extLst>
+              <a:ext uri="{FF2B5EF4-FFF2-40B4-BE49-F238E27FC236}">
+                <a16:creationId xmlns:a16="http://schemas.microsoft.com/office/drawing/2014/main" id="{C5D9F819-9470-6046-A855-A8EB25B5EED3}"/>
+              </a:ext>
+            </a:extLst>
+          </p:cNvPr>
+          <p:cNvSpPr txBox="1"/>
+          <p:nvPr/>
+        </p:nvSpPr>
+        <p:spPr>
+          <a:xfrm>
+            <a:off x="5103821" y="556656"/>
+            <a:ext cx="2773388" cy="923330"/>
+          </a:xfrm>
+          <a:prstGeom prst="rect">
+            <a:avLst/>
+          </a:prstGeom>
+          <a:noFill/>
+          <a:ln>
+            <a:noFill/>
+          </a:ln>
+        </p:spPr>
+        <p:txBody>
+          <a:bodyPr wrap="none" rtlCol="0">
+            <a:spAutoFit/>
+          </a:bodyPr>
+          <a:lstStyle/>
+          <a:p>
+            <a:pPr algn="ctr"/>
+            <a:r>
+              <a:rPr lang="hu-AE" b="1" dirty="0"/>
+              <a:t>Volciclab local network</a:t>
+            </a:r>
+          </a:p>
+          <a:p>
+            <a:pPr algn="ctr"/>
+            <a:r>
+              <a:rPr lang="hu-AE" dirty="0"/>
+              <a:t>(black cables)</a:t>
+            </a:r>
+            <a:br>
+              <a:rPr lang="hu-HU" dirty="0"/>
+            </a:br>
+            <a:r>
+              <a:rPr lang="hu-HU" dirty="0" err="1"/>
+              <a:t>Only</a:t>
+            </a:r>
+            <a:r>
+              <a:rPr lang="hu-HU" dirty="0"/>
+              <a:t> fixed IP </a:t>
+            </a:r>
+            <a:r>
+              <a:rPr lang="hu-HU" dirty="0" err="1"/>
+              <a:t>devices</a:t>
+            </a:r>
+            <a:r>
+              <a:rPr lang="hu-HU" dirty="0"/>
+              <a:t> </a:t>
+            </a:r>
+            <a:r>
+              <a:rPr lang="hu-HU" dirty="0" err="1"/>
+              <a:t>shown</a:t>
+            </a:r>
+            <a:endParaRPr lang="hu-AE" dirty="0"/>
+          </a:p>
+        </p:txBody>
+      </p:sp>
+      <p:sp>
+        <p:nvSpPr>
+          <p:cNvPr id="26" name="Szövegdoboz 25">
+            <a:extLst>
+              <a:ext uri="{FF2B5EF4-FFF2-40B4-BE49-F238E27FC236}">
+                <a16:creationId xmlns:a16="http://schemas.microsoft.com/office/drawing/2014/main" id="{3D883552-5148-2347-8ED9-2C811B0C94CE}"/>
+              </a:ext>
+            </a:extLst>
+          </p:cNvPr>
+          <p:cNvSpPr txBox="1"/>
+          <p:nvPr/>
+        </p:nvSpPr>
+        <p:spPr>
+          <a:xfrm>
+            <a:off x="3588871" y="3428559"/>
+            <a:ext cx="1579278" cy="430887"/>
+          </a:xfrm>
+          <a:prstGeom prst="rect">
+            <a:avLst/>
+          </a:prstGeom>
+          <a:noFill/>
+        </p:spPr>
+        <p:txBody>
+          <a:bodyPr wrap="none" rtlCol="0">
+            <a:spAutoFit/>
+          </a:bodyPr>
+          <a:lstStyle/>
+          <a:p>
+            <a:pPr algn="ctr"/>
+            <a:r>
+              <a:rPr lang="hu-AE" sz="1100" dirty="0"/>
+              <a:t>OptiTrack computer</a:t>
+            </a:r>
+          </a:p>
+          <a:p>
+            <a:pPr algn="ctr"/>
+            <a:r>
+              <a:rPr lang="hu-AE" sz="1100" dirty="0"/>
+              <a:t>Camera network (DHCP)</a:t>
+            </a:r>
+          </a:p>
+        </p:txBody>
+      </p:sp>
+      <p:sp>
+        <p:nvSpPr>
+          <p:cNvPr id="101" name="Szövegdoboz 100">
+            <a:extLst>
+              <a:ext uri="{FF2B5EF4-FFF2-40B4-BE49-F238E27FC236}">
+                <a16:creationId xmlns:a16="http://schemas.microsoft.com/office/drawing/2014/main" id="{274F1920-3907-7D41-9913-7290C8D1D1CE}"/>
+              </a:ext>
+            </a:extLst>
+          </p:cNvPr>
+          <p:cNvSpPr txBox="1"/>
+          <p:nvPr/>
+        </p:nvSpPr>
+        <p:spPr>
+          <a:xfrm>
+            <a:off x="1235510" y="5517407"/>
+            <a:ext cx="1739514" cy="1015663"/>
+          </a:xfrm>
+          <a:prstGeom prst="rect">
+            <a:avLst/>
+          </a:prstGeom>
+          <a:noFill/>
+          <a:ln>
+            <a:noFill/>
+          </a:ln>
+        </p:spPr>
+        <p:txBody>
+          <a:bodyPr wrap="none" rtlCol="0">
+            <a:spAutoFit/>
+          </a:bodyPr>
+          <a:lstStyle/>
+          <a:p>
+            <a:pPr algn="ctr"/>
+            <a:r>
+              <a:rPr lang="hu-AE" dirty="0">
+                <a:solidFill>
+                  <a:srgbClr val="00B0F0"/>
+                </a:solidFill>
+              </a:rPr>
+              <a:t>Camera network</a:t>
+            </a:r>
+          </a:p>
+          <a:p>
+            <a:pPr algn="ctr"/>
+            <a:r>
+              <a:rPr lang="hu-AE" dirty="0">
+                <a:solidFill>
+                  <a:srgbClr val="00B0F0"/>
+                </a:solidFill>
+              </a:rPr>
+              <a:t>(blue cables)</a:t>
+            </a:r>
+            <a:br>
+              <a:rPr lang="hu-AE" dirty="0">
+                <a:solidFill>
+                  <a:srgbClr val="00B0F0"/>
+                </a:solidFill>
+              </a:rPr>
+            </a:br>
+            <a:r>
+              <a:rPr lang="hu-AE" sz="1100" dirty="0">
+                <a:solidFill>
+                  <a:srgbClr val="00B0F0"/>
+                </a:solidFill>
+              </a:rPr>
+              <a:t>Do not connect</a:t>
+            </a:r>
+            <a:br>
+              <a:rPr lang="hu-AE" sz="1100" dirty="0">
+                <a:solidFill>
+                  <a:srgbClr val="00B0F0"/>
+                </a:solidFill>
+              </a:rPr>
+            </a:br>
+            <a:r>
+              <a:rPr lang="hu-AE" sz="1100" dirty="0">
+                <a:solidFill>
+                  <a:srgbClr val="00B0F0"/>
+                </a:solidFill>
+              </a:rPr>
+              <a:t>anything else</a:t>
+            </a:r>
+            <a:endParaRPr lang="hu-AE" dirty="0">
+              <a:solidFill>
+                <a:srgbClr val="00B0F0"/>
+              </a:solidFill>
+            </a:endParaRPr>
+          </a:p>
+        </p:txBody>
+      </p:sp>
+      <p:sp>
+        <p:nvSpPr>
+          <p:cNvPr id="28" name="Felhő 27">
+            <a:extLst>
+              <a:ext uri="{FF2B5EF4-FFF2-40B4-BE49-F238E27FC236}">
+                <a16:creationId xmlns:a16="http://schemas.microsoft.com/office/drawing/2014/main" id="{68801F5D-5721-2840-8BB2-817F83D2CFA2}"/>
+              </a:ext>
+            </a:extLst>
+          </p:cNvPr>
+          <p:cNvSpPr/>
+          <p:nvPr/>
+        </p:nvSpPr>
+        <p:spPr>
+          <a:xfrm rot="2706493">
+            <a:off x="10248557" y="251247"/>
+            <a:ext cx="2066775" cy="1100613"/>
+          </a:xfrm>
+          <a:prstGeom prst="cloud">
+            <a:avLst/>
+          </a:prstGeom>
+          <a:solidFill>
+            <a:schemeClr val="bg1"/>
+          </a:solidFill>
+          <a:ln w="12700">
+            <a:solidFill>
+              <a:schemeClr val="tx1"/>
+            </a:solidFill>
+          </a:ln>
+        </p:spPr>
+        <p:style>
+          <a:lnRef idx="2">
+            <a:schemeClr val="dk1">
+              <a:shade val="50000"/>
+            </a:schemeClr>
+          </a:lnRef>
+          <a:fillRef idx="1">
+            <a:schemeClr val="dk1"/>
+          </a:fillRef>
+          <a:effectRef idx="0">
+            <a:schemeClr val="dk1"/>
+          </a:effectRef>
+          <a:fontRef idx="minor">
+            <a:schemeClr val="lt1"/>
+          </a:fontRef>
+        </p:style>
+        <p:txBody>
+          <a:bodyPr rtlCol="0" anchor="ctr"/>
+          <a:lstStyle/>
+          <a:p>
+            <a:pPr algn="ctr"/>
+            <a:r>
+              <a:rPr lang="hu-AE" dirty="0">
+                <a:solidFill>
+                  <a:sysClr val="windowText" lastClr="000000"/>
+                </a:solidFill>
+              </a:rPr>
+              <a:t>NYUAD </a:t>
+            </a:r>
+            <a:r>
+              <a:rPr lang="hu-HU" dirty="0" err="1">
+                <a:solidFill>
+                  <a:sysClr val="windowText" lastClr="000000"/>
+                </a:solidFill>
+              </a:rPr>
+              <a:t>residential</a:t>
+            </a:r>
+            <a:r>
+              <a:rPr lang="hu-HU" dirty="0">
+                <a:solidFill>
+                  <a:sysClr val="windowText" lastClr="000000"/>
+                </a:solidFill>
+              </a:rPr>
+              <a:t> </a:t>
+            </a:r>
+            <a:r>
+              <a:rPr lang="hu-HU" dirty="0" err="1">
+                <a:solidFill>
+                  <a:sysClr val="windowText" lastClr="000000"/>
+                </a:solidFill>
+              </a:rPr>
+              <a:t>network</a:t>
+            </a:r>
+            <a:endParaRPr lang="hu-AE" dirty="0">
+              <a:solidFill>
+                <a:sysClr val="windowText" lastClr="000000"/>
+              </a:solidFill>
+            </a:endParaRPr>
+          </a:p>
+        </p:txBody>
+      </p:sp>
+      <p:pic>
+        <p:nvPicPr>
+          <p:cNvPr id="11" name="Kép 10">
+            <a:extLst>
+              <a:ext uri="{FF2B5EF4-FFF2-40B4-BE49-F238E27FC236}">
+                <a16:creationId xmlns:a16="http://schemas.microsoft.com/office/drawing/2014/main" id="{151041AE-1C29-5349-FF7F-1B490D23861B}"/>
+              </a:ext>
+            </a:extLst>
+          </p:cNvPr>
+          <p:cNvPicPr>
+            <a:picLocks noChangeAspect="1"/>
+          </p:cNvPicPr>
+          <p:nvPr/>
+        </p:nvPicPr>
+        <p:blipFill>
+          <a:blip r:embed="rId10"/>
+          <a:stretch>
+            <a:fillRect/>
+          </a:stretch>
+        </p:blipFill>
+        <p:spPr>
+          <a:xfrm>
+            <a:off x="6961402" y="2828269"/>
+            <a:ext cx="736100" cy="736100"/>
+          </a:xfrm>
+          <a:prstGeom prst="rect">
+            <a:avLst/>
+          </a:prstGeom>
+        </p:spPr>
+      </p:pic>
+      <p:sp>
+        <p:nvSpPr>
+          <p:cNvPr id="13" name="Szövegdoboz 12">
+            <a:extLst>
+              <a:ext uri="{FF2B5EF4-FFF2-40B4-BE49-F238E27FC236}">
+                <a16:creationId xmlns:a16="http://schemas.microsoft.com/office/drawing/2014/main" id="{4776D755-2F21-F3C6-A3AD-239FF7A27CD0}"/>
+              </a:ext>
+            </a:extLst>
+          </p:cNvPr>
+          <p:cNvSpPr txBox="1"/>
+          <p:nvPr/>
+        </p:nvSpPr>
+        <p:spPr>
+          <a:xfrm>
+            <a:off x="5453951" y="2913261"/>
+            <a:ext cx="1678666" cy="707886"/>
+          </a:xfrm>
+          <a:prstGeom prst="rect">
+            <a:avLst/>
+          </a:prstGeom>
+          <a:noFill/>
+        </p:spPr>
+        <p:txBody>
+          <a:bodyPr wrap="none" rtlCol="0">
+            <a:spAutoFit/>
+          </a:bodyPr>
+          <a:lstStyle/>
+          <a:p>
+            <a:pPr algn="r"/>
+            <a:r>
+              <a:rPr lang="hu-AE" sz="1100" dirty="0"/>
+              <a:t>Universal Robots UR3e</a:t>
+            </a:r>
+            <a:br>
+              <a:rPr lang="hu-AE" sz="1100" dirty="0"/>
+            </a:br>
+            <a:r>
+              <a:rPr lang="hu-AE" sz="1100" dirty="0"/>
+              <a:t>Robotic arm, direct access</a:t>
+            </a:r>
+          </a:p>
+          <a:p>
+            <a:pPr algn="r"/>
+            <a:r>
+              <a:rPr lang="hu-AE" dirty="0"/>
+              <a:t>192.168.42.10</a:t>
+            </a:r>
+          </a:p>
+        </p:txBody>
+      </p:sp>
+      <p:cxnSp>
+        <p:nvCxnSpPr>
+          <p:cNvPr id="21" name="Egyenes összekötő 20">
+            <a:extLst>
+              <a:ext uri="{FF2B5EF4-FFF2-40B4-BE49-F238E27FC236}">
+                <a16:creationId xmlns:a16="http://schemas.microsoft.com/office/drawing/2014/main" id="{1E8E8C58-849A-2601-A02B-CC6AE70C5CD4}"/>
+              </a:ext>
+            </a:extLst>
+          </p:cNvPr>
+          <p:cNvCxnSpPr>
+            <a:cxnSpLocks/>
+          </p:cNvCxnSpPr>
+          <p:nvPr/>
+        </p:nvCxnSpPr>
+        <p:spPr>
+          <a:xfrm flipV="1">
+            <a:off x="7459721" y="2604861"/>
+            <a:ext cx="2185320" cy="805302"/>
+          </a:xfrm>
+          <a:prstGeom prst="line">
+            <a:avLst/>
+          </a:prstGeom>
+          <a:ln w="12700">
+            <a:solidFill>
+              <a:schemeClr val="tx1"/>
+            </a:solidFill>
           </a:ln>
         </p:spPr>
         <p:style>
@@ -5021,31 +5805,30 @@
       </p:cxnSp>
       <p:cxnSp>
         <p:nvCxnSpPr>
-          <p:cNvPr id="80" name="Egyenes összekötő 79">
-            <a:extLst>
-              <a:ext uri="{FF2B5EF4-FFF2-40B4-BE49-F238E27FC236}">
-                <a16:creationId xmlns:a16="http://schemas.microsoft.com/office/drawing/2014/main" id="{DC692F46-BA85-5B44-B3B4-66F792A54228}"/>
+          <p:cNvPr id="51" name="Egyenes összekötő 50">
+            <a:extLst>
+              <a:ext uri="{FF2B5EF4-FFF2-40B4-BE49-F238E27FC236}">
+                <a16:creationId xmlns:a16="http://schemas.microsoft.com/office/drawing/2014/main" id="{C9548128-5ADB-0D09-758D-26160D301DE1}"/>
               </a:ext>
             </a:extLst>
           </p:cNvPr>
           <p:cNvCxnSpPr>
             <a:cxnSpLocks/>
+            <a:stCxn id="43" idx="0"/>
           </p:cNvCxnSpPr>
           <p:nvPr/>
         </p:nvCxnSpPr>
         <p:spPr>
-          <a:xfrm flipH="1">
-            <a:off x="11911266" y="1387929"/>
-            <a:ext cx="126577" cy="5257129"/>
+          <a:xfrm flipV="1">
+            <a:off x="9450137" y="2526294"/>
+            <a:ext cx="626037" cy="1308286"/>
           </a:xfrm>
           <a:prstGeom prst="line">
             <a:avLst/>
           </a:prstGeom>
           <a:ln w="12700">
             <a:solidFill>
-              <a:schemeClr val="bg2">
-                <a:lumMod val="75000"/>
-              </a:schemeClr>
+              <a:schemeClr val="tx1"/>
             </a:solidFill>
           </a:ln>
         </p:spPr>
@@ -5064,190 +5847,12 @@
           </a:fontRef>
         </p:style>
       </p:cxnSp>
-      <p:cxnSp>
-        <p:nvCxnSpPr>
-          <p:cNvPr id="82" name="Egyenes összekötő 81">
-            <a:extLst>
-              <a:ext uri="{FF2B5EF4-FFF2-40B4-BE49-F238E27FC236}">
-                <a16:creationId xmlns:a16="http://schemas.microsoft.com/office/drawing/2014/main" id="{7A9634F5-01F3-784D-A43A-D3BFDF9289BE}"/>
-              </a:ext>
-            </a:extLst>
-          </p:cNvPr>
-          <p:cNvCxnSpPr>
-            <a:cxnSpLocks/>
-          </p:cNvCxnSpPr>
-          <p:nvPr/>
-        </p:nvCxnSpPr>
-        <p:spPr>
-          <a:xfrm flipH="1">
-            <a:off x="6758118" y="6645058"/>
-            <a:ext cx="5153148" cy="0"/>
-          </a:xfrm>
-          <a:prstGeom prst="line">
-            <a:avLst/>
-          </a:prstGeom>
-          <a:ln w="12700">
-            <a:solidFill>
-              <a:schemeClr val="bg2">
-                <a:lumMod val="75000"/>
-              </a:schemeClr>
-            </a:solidFill>
-          </a:ln>
-        </p:spPr>
-        <p:style>
-          <a:lnRef idx="1">
-            <a:schemeClr val="accent1"/>
-          </a:lnRef>
-          <a:fillRef idx="0">
-            <a:schemeClr val="accent1"/>
-          </a:fillRef>
-          <a:effectRef idx="0">
-            <a:schemeClr val="accent1"/>
-          </a:effectRef>
-          <a:fontRef idx="minor">
-            <a:schemeClr val="tx1"/>
-          </a:fontRef>
-        </p:style>
-      </p:cxnSp>
-      <p:cxnSp>
-        <p:nvCxnSpPr>
-          <p:cNvPr id="84" name="Egyenes összekötő 83">
-            <a:extLst>
-              <a:ext uri="{FF2B5EF4-FFF2-40B4-BE49-F238E27FC236}">
-                <a16:creationId xmlns:a16="http://schemas.microsoft.com/office/drawing/2014/main" id="{C6F1840E-800D-2245-98D7-CD43BA148F25}"/>
-              </a:ext>
-            </a:extLst>
-          </p:cNvPr>
-          <p:cNvCxnSpPr>
-            <a:cxnSpLocks/>
-          </p:cNvCxnSpPr>
-          <p:nvPr/>
-        </p:nvCxnSpPr>
-        <p:spPr>
-          <a:xfrm flipH="1" flipV="1">
-            <a:off x="6426999" y="6111525"/>
-            <a:ext cx="329047" cy="533533"/>
-          </a:xfrm>
-          <a:prstGeom prst="line">
-            <a:avLst/>
-          </a:prstGeom>
-          <a:ln w="12700">
-            <a:solidFill>
-              <a:schemeClr val="bg2">
-                <a:lumMod val="75000"/>
-              </a:schemeClr>
-            </a:solidFill>
-          </a:ln>
-        </p:spPr>
-        <p:style>
-          <a:lnRef idx="1">
-            <a:schemeClr val="accent1"/>
-          </a:lnRef>
-          <a:fillRef idx="0">
-            <a:schemeClr val="accent1"/>
-          </a:fillRef>
-          <a:effectRef idx="0">
-            <a:schemeClr val="accent1"/>
-          </a:effectRef>
-          <a:fontRef idx="minor">
-            <a:schemeClr val="tx1"/>
-          </a:fontRef>
-        </p:style>
-      </p:cxnSp>
-      <p:cxnSp>
-        <p:nvCxnSpPr>
-          <p:cNvPr id="86" name="Egyenes összekötő 85">
-            <a:extLst>
-              <a:ext uri="{FF2B5EF4-FFF2-40B4-BE49-F238E27FC236}">
-                <a16:creationId xmlns:a16="http://schemas.microsoft.com/office/drawing/2014/main" id="{10156D0D-AF20-8D46-A73D-9C2582F1F4F4}"/>
-              </a:ext>
-            </a:extLst>
-          </p:cNvPr>
-          <p:cNvCxnSpPr>
-            <a:cxnSpLocks/>
-          </p:cNvCxnSpPr>
-          <p:nvPr/>
-        </p:nvCxnSpPr>
-        <p:spPr>
-          <a:xfrm flipH="1">
-            <a:off x="11874674" y="1387929"/>
-            <a:ext cx="83002" cy="2538816"/>
-          </a:xfrm>
-          <a:prstGeom prst="line">
-            <a:avLst/>
-          </a:prstGeom>
-          <a:ln w="12700">
-            <a:solidFill>
-              <a:schemeClr val="bg2">
-                <a:lumMod val="75000"/>
-              </a:schemeClr>
-            </a:solidFill>
-          </a:ln>
-        </p:spPr>
-        <p:style>
-          <a:lnRef idx="1">
-            <a:schemeClr val="accent1"/>
-          </a:lnRef>
-          <a:fillRef idx="0">
-            <a:schemeClr val="accent1"/>
-          </a:fillRef>
-          <a:effectRef idx="0">
-            <a:schemeClr val="accent1"/>
-          </a:effectRef>
-          <a:fontRef idx="minor">
-            <a:schemeClr val="tx1"/>
-          </a:fontRef>
-        </p:style>
-      </p:cxnSp>
-      <p:cxnSp>
-        <p:nvCxnSpPr>
-          <p:cNvPr id="88" name="Egyenes összekötő 87">
-            <a:extLst>
-              <a:ext uri="{FF2B5EF4-FFF2-40B4-BE49-F238E27FC236}">
-                <a16:creationId xmlns:a16="http://schemas.microsoft.com/office/drawing/2014/main" id="{8F9A67E5-3B7C-FF4C-ACB2-46BACF4DF048}"/>
-              </a:ext>
-            </a:extLst>
-          </p:cNvPr>
-          <p:cNvCxnSpPr/>
-          <p:nvPr/>
-        </p:nvCxnSpPr>
-        <p:spPr>
-          <a:xfrm flipH="1">
-            <a:off x="9701408" y="3926745"/>
-            <a:ext cx="2173266" cy="1127507"/>
-          </a:xfrm>
-          <a:prstGeom prst="line">
-            <a:avLst/>
-          </a:prstGeom>
-          <a:ln w="12700">
-            <a:solidFill>
-              <a:schemeClr val="bg2">
-                <a:lumMod val="75000"/>
-              </a:schemeClr>
-            </a:solidFill>
-          </a:ln>
-        </p:spPr>
-        <p:style>
-          <a:lnRef idx="1">
-            <a:schemeClr val="accent1"/>
-          </a:lnRef>
-          <a:fillRef idx="0">
-            <a:schemeClr val="accent1"/>
-          </a:fillRef>
-          <a:effectRef idx="0">
-            <a:schemeClr val="accent1"/>
-          </a:effectRef>
-          <a:fontRef idx="minor">
-            <a:schemeClr val="tx1"/>
-          </a:fontRef>
-        </p:style>
-      </p:cxnSp>
-      <p:sp>
-        <p:nvSpPr>
-          <p:cNvPr id="91" name="Szövegdoboz 90">
-            <a:extLst>
-              <a:ext uri="{FF2B5EF4-FFF2-40B4-BE49-F238E27FC236}">
-                <a16:creationId xmlns:a16="http://schemas.microsoft.com/office/drawing/2014/main" id="{EA1B268B-D4FF-E64A-89F6-832711C506AA}"/>
+      <p:sp>
+        <p:nvSpPr>
+          <p:cNvPr id="55" name="Szövegdoboz 54">
+            <a:extLst>
+              <a:ext uri="{FF2B5EF4-FFF2-40B4-BE49-F238E27FC236}">
+                <a16:creationId xmlns:a16="http://schemas.microsoft.com/office/drawing/2014/main" id="{23CAA477-CB21-0BDA-71D1-FFEF114C4DAC}"/>
               </a:ext>
             </a:extLst>
           </p:cNvPr>
@@ -5255,9 +5860,9 @@
           <p:nvPr/>
         </p:nvSpPr>
         <p:spPr>
-          <a:xfrm rot="21020811">
-            <a:off x="9767389" y="812535"/>
-            <a:ext cx="974947" cy="246221"/>
+          <a:xfrm rot="17761844">
+            <a:off x="9137883" y="3452904"/>
+            <a:ext cx="736099" cy="246221"/>
           </a:xfrm>
           <a:prstGeom prst="rect">
             <a:avLst/>
@@ -5272,17 +5877,17 @@
           <a:p>
             <a:r>
               <a:rPr lang="hu-AE" sz="1000" dirty="0"/>
-              <a:t>(when needed)</a:t>
-            </a:r>
-          </a:p>
-        </p:txBody>
-      </p:sp>
-      <p:sp>
-        <p:nvSpPr>
-          <p:cNvPr id="93" name="Szövegdoboz 92">
-            <a:extLst>
-              <a:ext uri="{FF2B5EF4-FFF2-40B4-BE49-F238E27FC236}">
-                <a16:creationId xmlns:a16="http://schemas.microsoft.com/office/drawing/2014/main" id="{A30FF902-041F-594E-A260-BC659D11C908}"/>
+              <a:t>Ethernet 1</a:t>
+            </a:r>
+          </a:p>
+        </p:txBody>
+      </p:sp>
+      <p:sp>
+        <p:nvSpPr>
+          <p:cNvPr id="57" name="Szövegdoboz 56">
+            <a:extLst>
+              <a:ext uri="{FF2B5EF4-FFF2-40B4-BE49-F238E27FC236}">
+                <a16:creationId xmlns:a16="http://schemas.microsoft.com/office/drawing/2014/main" id="{E6562673-7CAC-193F-F2E6-700249F27CEF}"/>
               </a:ext>
             </a:extLst>
           </p:cNvPr>
@@ -5290,9 +5895,9 @@
           <p:nvPr/>
         </p:nvSpPr>
         <p:spPr>
-          <a:xfrm rot="16200000">
-            <a:off x="5721788" y="4561561"/>
-            <a:ext cx="736099" cy="246221"/>
+          <a:xfrm>
+            <a:off x="9897015" y="3842898"/>
+            <a:ext cx="1726361" cy="1092607"/>
           </a:xfrm>
           <a:prstGeom prst="rect">
             <a:avLst/>
@@ -5300,513 +5905,6 @@
           <a:noFill/>
         </p:spPr>
         <p:txBody>
-          <a:bodyPr wrap="none" rtlCol="0">
-            <a:spAutoFit/>
-          </a:bodyPr>
-          <a:lstStyle/>
-          <a:p>
-            <a:r>
-              <a:rPr lang="hu-AE" sz="1000" dirty="0"/>
-              <a:t>Ethernet 1</a:t>
-            </a:r>
-          </a:p>
-        </p:txBody>
-      </p:sp>
-      <p:sp>
-        <p:nvSpPr>
-          <p:cNvPr id="94" name="Szövegdoboz 93">
-            <a:extLst>
-              <a:ext uri="{FF2B5EF4-FFF2-40B4-BE49-F238E27FC236}">
-                <a16:creationId xmlns:a16="http://schemas.microsoft.com/office/drawing/2014/main" id="{13418819-1647-1842-A2F0-E6AE8629D704}"/>
-              </a:ext>
-            </a:extLst>
-          </p:cNvPr>
-          <p:cNvSpPr txBox="1"/>
-          <p:nvPr/>
-        </p:nvSpPr>
-        <p:spPr>
-          <a:xfrm rot="17254058">
-            <a:off x="8976434" y="4597118"/>
-            <a:ext cx="736099" cy="246221"/>
-          </a:xfrm>
-          <a:prstGeom prst="rect">
-            <a:avLst/>
-          </a:prstGeom>
-          <a:noFill/>
-        </p:spPr>
-        <p:txBody>
-          <a:bodyPr wrap="none" rtlCol="0">
-            <a:spAutoFit/>
-          </a:bodyPr>
-          <a:lstStyle/>
-          <a:p>
-            <a:r>
-              <a:rPr lang="hu-AE" sz="1000" dirty="0"/>
-              <a:t>Ethernet 1</a:t>
-            </a:r>
-          </a:p>
-        </p:txBody>
-      </p:sp>
-      <p:sp>
-        <p:nvSpPr>
-          <p:cNvPr id="99" name="Szövegdoboz 98">
-            <a:extLst>
-              <a:ext uri="{FF2B5EF4-FFF2-40B4-BE49-F238E27FC236}">
-                <a16:creationId xmlns:a16="http://schemas.microsoft.com/office/drawing/2014/main" id="{541A0CF6-F5B7-1D41-9AF7-34431AC52B80}"/>
-              </a:ext>
-            </a:extLst>
-          </p:cNvPr>
-          <p:cNvSpPr txBox="1"/>
-          <p:nvPr/>
-        </p:nvSpPr>
-        <p:spPr>
-          <a:xfrm rot="19824765">
-            <a:off x="9605384" y="4669853"/>
-            <a:ext cx="736099" cy="246221"/>
-          </a:xfrm>
-          <a:prstGeom prst="rect">
-            <a:avLst/>
-          </a:prstGeom>
-          <a:noFill/>
-        </p:spPr>
-        <p:txBody>
-          <a:bodyPr wrap="none" rtlCol="0">
-            <a:spAutoFit/>
-          </a:bodyPr>
-          <a:lstStyle/>
-          <a:p>
-            <a:r>
-              <a:rPr lang="hu-AE" sz="1000" dirty="0"/>
-              <a:t>Ethernet 2</a:t>
-            </a:r>
-          </a:p>
-        </p:txBody>
-      </p:sp>
-      <p:sp>
-        <p:nvSpPr>
-          <p:cNvPr id="100" name="Szövegdoboz 99">
-            <a:extLst>
-              <a:ext uri="{FF2B5EF4-FFF2-40B4-BE49-F238E27FC236}">
-                <a16:creationId xmlns:a16="http://schemas.microsoft.com/office/drawing/2014/main" id="{804BD974-5EB6-7645-888A-B6513251376D}"/>
-              </a:ext>
-            </a:extLst>
-          </p:cNvPr>
-          <p:cNvSpPr txBox="1"/>
-          <p:nvPr/>
-        </p:nvSpPr>
-        <p:spPr>
-          <a:xfrm rot="16200000">
-            <a:off x="10965654" y="2289360"/>
-            <a:ext cx="1645002" cy="246221"/>
-          </a:xfrm>
-          <a:prstGeom prst="rect">
-            <a:avLst/>
-          </a:prstGeom>
-          <a:noFill/>
-        </p:spPr>
-        <p:txBody>
-          <a:bodyPr wrap="none" rtlCol="0">
-            <a:spAutoFit/>
-          </a:bodyPr>
-          <a:lstStyle/>
-          <a:p>
-            <a:r>
-              <a:rPr lang="hu-AE" sz="1000" dirty="0"/>
-              <a:t>Ethernet sockets on lab wall</a:t>
-            </a:r>
-          </a:p>
-        </p:txBody>
-      </p:sp>
-      <p:sp>
-        <p:nvSpPr>
-          <p:cNvPr id="102" name="Téglalap 101">
-            <a:extLst>
-              <a:ext uri="{FF2B5EF4-FFF2-40B4-BE49-F238E27FC236}">
-                <a16:creationId xmlns:a16="http://schemas.microsoft.com/office/drawing/2014/main" id="{8818C8ED-0F3A-5F4D-8A08-9E0C99BA32DE}"/>
-              </a:ext>
-            </a:extLst>
-          </p:cNvPr>
-          <p:cNvSpPr/>
-          <p:nvPr/>
-        </p:nvSpPr>
-        <p:spPr>
-          <a:xfrm>
-            <a:off x="76944" y="590230"/>
-            <a:ext cx="5029413" cy="5960790"/>
-          </a:xfrm>
-          <a:prstGeom prst="rect">
-            <a:avLst/>
-          </a:prstGeom>
-          <a:noFill/>
-          <a:ln w="28575">
-            <a:solidFill>
-              <a:srgbClr val="00B0F0"/>
-            </a:solidFill>
-          </a:ln>
-        </p:spPr>
-        <p:style>
-          <a:lnRef idx="2">
-            <a:schemeClr val="accent1">
-              <a:shade val="50000"/>
-            </a:schemeClr>
-          </a:lnRef>
-          <a:fillRef idx="1">
-            <a:schemeClr val="accent1"/>
-          </a:fillRef>
-          <a:effectRef idx="0">
-            <a:schemeClr val="accent1"/>
-          </a:effectRef>
-          <a:fontRef idx="minor">
-            <a:schemeClr val="lt1"/>
-          </a:fontRef>
-        </p:style>
-        <p:txBody>
-          <a:bodyPr rtlCol="0" anchor="ctr"/>
-          <a:lstStyle/>
-          <a:p>
-            <a:pPr algn="ctr"/>
-            <a:endParaRPr lang="hu-AE"/>
-          </a:p>
-        </p:txBody>
-      </p:sp>
-      <p:sp>
-        <p:nvSpPr>
-          <p:cNvPr id="32" name="Szövegdoboz 31">
-            <a:extLst>
-              <a:ext uri="{FF2B5EF4-FFF2-40B4-BE49-F238E27FC236}">
-                <a16:creationId xmlns:a16="http://schemas.microsoft.com/office/drawing/2014/main" id="{3FBDDDB9-5398-5D41-8FDE-DB176EDF5931}"/>
-              </a:ext>
-            </a:extLst>
-          </p:cNvPr>
-          <p:cNvSpPr txBox="1"/>
-          <p:nvPr/>
-        </p:nvSpPr>
-        <p:spPr>
-          <a:xfrm>
-            <a:off x="5008986" y="1519064"/>
-            <a:ext cx="1410964" cy="707886"/>
-          </a:xfrm>
-          <a:prstGeom prst="rect">
-            <a:avLst/>
-          </a:prstGeom>
-          <a:noFill/>
-        </p:spPr>
-        <p:txBody>
-          <a:bodyPr wrap="none" rtlCol="0">
-            <a:spAutoFit/>
-          </a:bodyPr>
-          <a:lstStyle/>
-          <a:p>
-            <a:pPr algn="r"/>
-            <a:r>
-              <a:rPr lang="hu-AE" sz="1100" dirty="0"/>
-              <a:t>OptiTrack computer</a:t>
-            </a:r>
-          </a:p>
-          <a:p>
-            <a:pPr algn="r"/>
-            <a:r>
-              <a:rPr lang="hu-AE" sz="1100" dirty="0"/>
-              <a:t>Volciclab network</a:t>
-            </a:r>
-          </a:p>
-          <a:p>
-            <a:pPr algn="r"/>
-            <a:r>
-              <a:rPr lang="hu-AE" dirty="0"/>
-              <a:t>192.168.42.5</a:t>
-            </a:r>
-          </a:p>
-        </p:txBody>
-      </p:sp>
-      <p:sp>
-        <p:nvSpPr>
-          <p:cNvPr id="103" name="Téglalap 102">
-            <a:extLst>
-              <a:ext uri="{FF2B5EF4-FFF2-40B4-BE49-F238E27FC236}">
-                <a16:creationId xmlns:a16="http://schemas.microsoft.com/office/drawing/2014/main" id="{8BA67D5F-C9DF-484B-8FB7-06AFBEA157A7}"/>
-              </a:ext>
-            </a:extLst>
-          </p:cNvPr>
-          <p:cNvSpPr/>
-          <p:nvPr/>
-        </p:nvSpPr>
-        <p:spPr>
-          <a:xfrm>
-            <a:off x="3555550" y="531179"/>
-            <a:ext cx="7770229" cy="5957300"/>
-          </a:xfrm>
-          <a:prstGeom prst="rect">
-            <a:avLst/>
-          </a:prstGeom>
-          <a:noFill/>
-          <a:ln w="28575">
-            <a:solidFill>
-              <a:schemeClr val="tx1"/>
-            </a:solidFill>
-          </a:ln>
-        </p:spPr>
-        <p:style>
-          <a:lnRef idx="2">
-            <a:schemeClr val="accent1">
-              <a:shade val="50000"/>
-            </a:schemeClr>
-          </a:lnRef>
-          <a:fillRef idx="1">
-            <a:schemeClr val="accent1"/>
-          </a:fillRef>
-          <a:effectRef idx="0">
-            <a:schemeClr val="accent1"/>
-          </a:effectRef>
-          <a:fontRef idx="minor">
-            <a:schemeClr val="lt1"/>
-          </a:fontRef>
-        </p:style>
-        <p:txBody>
-          <a:bodyPr rtlCol="0" anchor="ctr"/>
-          <a:lstStyle/>
-          <a:p>
-            <a:pPr algn="ctr"/>
-            <a:endParaRPr lang="hu-AE"/>
-          </a:p>
-        </p:txBody>
-      </p:sp>
-      <p:sp>
-        <p:nvSpPr>
-          <p:cNvPr id="104" name="Szövegdoboz 103">
-            <a:extLst>
-              <a:ext uri="{FF2B5EF4-FFF2-40B4-BE49-F238E27FC236}">
-                <a16:creationId xmlns:a16="http://schemas.microsoft.com/office/drawing/2014/main" id="{C5D9F819-9470-6046-A855-A8EB25B5EED3}"/>
-              </a:ext>
-            </a:extLst>
-          </p:cNvPr>
-          <p:cNvSpPr txBox="1"/>
-          <p:nvPr/>
-        </p:nvSpPr>
-        <p:spPr>
-          <a:xfrm>
-            <a:off x="5496885" y="801554"/>
-            <a:ext cx="2336986" cy="646331"/>
-          </a:xfrm>
-          <a:prstGeom prst="rect">
-            <a:avLst/>
-          </a:prstGeom>
-          <a:noFill/>
-          <a:ln>
-            <a:noFill/>
-          </a:ln>
-        </p:spPr>
-        <p:txBody>
-          <a:bodyPr wrap="none" rtlCol="0">
-            <a:spAutoFit/>
-          </a:bodyPr>
-          <a:lstStyle/>
-          <a:p>
-            <a:pPr algn="ctr"/>
-            <a:r>
-              <a:rPr lang="hu-AE" dirty="0"/>
-              <a:t>Volciclab local network</a:t>
-            </a:r>
-          </a:p>
-          <a:p>
-            <a:pPr algn="ctr"/>
-            <a:r>
-              <a:rPr lang="hu-AE" dirty="0"/>
-              <a:t>(black cables)</a:t>
-            </a:r>
-          </a:p>
-        </p:txBody>
-      </p:sp>
-      <p:sp>
-        <p:nvSpPr>
-          <p:cNvPr id="26" name="Szövegdoboz 25">
-            <a:extLst>
-              <a:ext uri="{FF2B5EF4-FFF2-40B4-BE49-F238E27FC236}">
-                <a16:creationId xmlns:a16="http://schemas.microsoft.com/office/drawing/2014/main" id="{3D883552-5148-2347-8ED9-2C811B0C94CE}"/>
-              </a:ext>
-            </a:extLst>
-          </p:cNvPr>
-          <p:cNvSpPr txBox="1"/>
-          <p:nvPr/>
-        </p:nvSpPr>
-        <p:spPr>
-          <a:xfrm>
-            <a:off x="3588871" y="3428559"/>
-            <a:ext cx="1579278" cy="430887"/>
-          </a:xfrm>
-          <a:prstGeom prst="rect">
-            <a:avLst/>
-          </a:prstGeom>
-          <a:noFill/>
-        </p:spPr>
-        <p:txBody>
-          <a:bodyPr wrap="none" rtlCol="0">
-            <a:spAutoFit/>
-          </a:bodyPr>
-          <a:lstStyle/>
-          <a:p>
-            <a:pPr algn="ctr"/>
-            <a:r>
-              <a:rPr lang="hu-AE" sz="1100" dirty="0"/>
-              <a:t>OptiTrack computer</a:t>
-            </a:r>
-          </a:p>
-          <a:p>
-            <a:pPr algn="ctr"/>
-            <a:r>
-              <a:rPr lang="hu-AE" sz="1100" dirty="0"/>
-              <a:t>Camera network (DHCP)</a:t>
-            </a:r>
-          </a:p>
-        </p:txBody>
-      </p:sp>
-      <p:sp>
-        <p:nvSpPr>
-          <p:cNvPr id="101" name="Szövegdoboz 100">
-            <a:extLst>
-              <a:ext uri="{FF2B5EF4-FFF2-40B4-BE49-F238E27FC236}">
-                <a16:creationId xmlns:a16="http://schemas.microsoft.com/office/drawing/2014/main" id="{274F1920-3907-7D41-9913-7290C8D1D1CE}"/>
-              </a:ext>
-            </a:extLst>
-          </p:cNvPr>
-          <p:cNvSpPr txBox="1"/>
-          <p:nvPr/>
-        </p:nvSpPr>
-        <p:spPr>
-          <a:xfrm>
-            <a:off x="1235510" y="5517407"/>
-            <a:ext cx="1739514" cy="1015663"/>
-          </a:xfrm>
-          <a:prstGeom prst="rect">
-            <a:avLst/>
-          </a:prstGeom>
-          <a:noFill/>
-          <a:ln>
-            <a:noFill/>
-          </a:ln>
-        </p:spPr>
-        <p:txBody>
-          <a:bodyPr wrap="none" rtlCol="0">
-            <a:spAutoFit/>
-          </a:bodyPr>
-          <a:lstStyle/>
-          <a:p>
-            <a:pPr algn="ctr"/>
-            <a:r>
-              <a:rPr lang="hu-AE" dirty="0">
-                <a:solidFill>
-                  <a:srgbClr val="00B0F0"/>
-                </a:solidFill>
-              </a:rPr>
-              <a:t>Camera network</a:t>
-            </a:r>
-          </a:p>
-          <a:p>
-            <a:pPr algn="ctr"/>
-            <a:r>
-              <a:rPr lang="hu-AE" dirty="0">
-                <a:solidFill>
-                  <a:srgbClr val="00B0F0"/>
-                </a:solidFill>
-              </a:rPr>
-              <a:t>(blue cables)</a:t>
-            </a:r>
-            <a:br>
-              <a:rPr lang="hu-AE" dirty="0">
-                <a:solidFill>
-                  <a:srgbClr val="00B0F0"/>
-                </a:solidFill>
-              </a:rPr>
-            </a:br>
-            <a:r>
-              <a:rPr lang="hu-AE" sz="1100" dirty="0">
-                <a:solidFill>
-                  <a:srgbClr val="00B0F0"/>
-                </a:solidFill>
-              </a:rPr>
-              <a:t>Do not connect</a:t>
-            </a:r>
-            <a:br>
-              <a:rPr lang="hu-AE" sz="1100" dirty="0">
-                <a:solidFill>
-                  <a:srgbClr val="00B0F0"/>
-                </a:solidFill>
-              </a:rPr>
-            </a:br>
-            <a:r>
-              <a:rPr lang="hu-AE" sz="1100" dirty="0">
-                <a:solidFill>
-                  <a:srgbClr val="00B0F0"/>
-                </a:solidFill>
-              </a:rPr>
-              <a:t>anything else</a:t>
-            </a:r>
-            <a:endParaRPr lang="hu-AE" dirty="0">
-              <a:solidFill>
-                <a:srgbClr val="00B0F0"/>
-              </a:solidFill>
-            </a:endParaRPr>
-          </a:p>
-        </p:txBody>
-      </p:sp>
-      <p:sp>
-        <p:nvSpPr>
-          <p:cNvPr id="95" name="Szövegdoboz 94">
-            <a:extLst>
-              <a:ext uri="{FF2B5EF4-FFF2-40B4-BE49-F238E27FC236}">
-                <a16:creationId xmlns:a16="http://schemas.microsoft.com/office/drawing/2014/main" id="{533E4741-00FB-B74A-8582-E7E2865D8811}"/>
-              </a:ext>
-            </a:extLst>
-          </p:cNvPr>
-          <p:cNvSpPr txBox="1"/>
-          <p:nvPr/>
-        </p:nvSpPr>
-        <p:spPr>
-          <a:xfrm rot="3436661">
-            <a:off x="6252303" y="6084843"/>
-            <a:ext cx="736099" cy="246221"/>
-          </a:xfrm>
-          <a:prstGeom prst="rect">
-            <a:avLst/>
-          </a:prstGeom>
-          <a:noFill/>
-        </p:spPr>
-        <p:txBody>
-          <a:bodyPr wrap="none" rtlCol="0">
-            <a:spAutoFit/>
-          </a:bodyPr>
-          <a:lstStyle/>
-          <a:p>
-            <a:r>
-              <a:rPr lang="hu-AE" sz="1000" dirty="0"/>
-              <a:t>Ethernet 2</a:t>
-            </a:r>
-          </a:p>
-        </p:txBody>
-      </p:sp>
-      <p:sp>
-        <p:nvSpPr>
-          <p:cNvPr id="42" name="Szövegdoboz 41">
-            <a:extLst>
-              <a:ext uri="{FF2B5EF4-FFF2-40B4-BE49-F238E27FC236}">
-                <a16:creationId xmlns:a16="http://schemas.microsoft.com/office/drawing/2014/main" id="{A89E5010-4815-0A42-9A84-8F76F1D8955E}"/>
-              </a:ext>
-            </a:extLst>
-          </p:cNvPr>
-          <p:cNvSpPr txBox="1"/>
-          <p:nvPr/>
-        </p:nvSpPr>
-        <p:spPr>
-          <a:xfrm>
-            <a:off x="9791847" y="4901371"/>
-            <a:ext cx="1574923" cy="1092607"/>
-          </a:xfrm>
-          <a:prstGeom prst="rect">
-            <a:avLst/>
-          </a:prstGeom>
-          <a:noFill/>
-        </p:spPr>
-        <p:txBody>
           <a:bodyPr wrap="square" rtlCol="0">
             <a:spAutoFit/>
           </a:bodyPr>
@@ -5814,221 +5912,40 @@
           <a:p>
             <a:r>
               <a:rPr lang="hu-AE" dirty="0"/>
-              <a:t>Volciclab 2</a:t>
-            </a:r>
-          </a:p>
-          <a:p>
-            <a:r>
-              <a:rPr lang="hu-AE" sz="1100" dirty="0"/>
-              <a:t>Experimental computer</a:t>
+              <a:t>Volciclab </a:t>
+            </a:r>
+            <a:r>
+              <a:rPr lang="hu-HU" dirty="0"/>
+              <a:t>2</a:t>
+            </a:r>
+            <a:endParaRPr lang="hu-AE" dirty="0"/>
+          </a:p>
+          <a:p>
+            <a:r>
+              <a:rPr lang="hu-HU" sz="1100" dirty="0" err="1"/>
+              <a:t>Experimental</a:t>
+            </a:r>
+            <a:r>
+              <a:rPr lang="hu-HU" sz="1100" dirty="0"/>
+              <a:t> computer</a:t>
             </a:r>
           </a:p>
           <a:p>
             <a:r>
               <a:rPr lang="hu-AE" dirty="0"/>
-              <a:t>192.168.42.7</a:t>
-            </a:r>
-          </a:p>
-          <a:p>
+              <a:t>192.168.42.</a:t>
+            </a:r>
+            <a:r>
+              <a:rPr lang="hu-HU" dirty="0"/>
+              <a:t>8</a:t>
+            </a:r>
             <a:endParaRPr lang="hu-AE" dirty="0"/>
           </a:p>
-        </p:txBody>
-      </p:sp>
-      <p:sp>
-        <p:nvSpPr>
-          <p:cNvPr id="28" name="Felhő 27">
-            <a:extLst>
-              <a:ext uri="{FF2B5EF4-FFF2-40B4-BE49-F238E27FC236}">
-                <a16:creationId xmlns:a16="http://schemas.microsoft.com/office/drawing/2014/main" id="{68801F5D-5721-2840-8BB2-817F83D2CFA2}"/>
-              </a:ext>
-            </a:extLst>
-          </p:cNvPr>
-          <p:cNvSpPr/>
-          <p:nvPr/>
-        </p:nvSpPr>
-        <p:spPr>
-          <a:xfrm rot="2706493">
-            <a:off x="10248557" y="251247"/>
-            <a:ext cx="2066775" cy="1100613"/>
-          </a:xfrm>
-          <a:prstGeom prst="cloud">
-            <a:avLst/>
-          </a:prstGeom>
-          <a:solidFill>
-            <a:schemeClr val="bg1"/>
-          </a:solidFill>
-          <a:ln w="12700">
-            <a:solidFill>
-              <a:schemeClr val="tx1"/>
-            </a:solidFill>
-          </a:ln>
-        </p:spPr>
-        <p:style>
-          <a:lnRef idx="2">
-            <a:schemeClr val="dk1">
-              <a:shade val="50000"/>
-            </a:schemeClr>
-          </a:lnRef>
-          <a:fillRef idx="1">
-            <a:schemeClr val="dk1"/>
-          </a:fillRef>
-          <a:effectRef idx="0">
-            <a:schemeClr val="dk1"/>
-          </a:effectRef>
-          <a:fontRef idx="minor">
-            <a:schemeClr val="lt1"/>
-          </a:fontRef>
-        </p:style>
-        <p:txBody>
-          <a:bodyPr rtlCol="0" anchor="ctr"/>
-          <a:lstStyle/>
-          <a:p>
-            <a:pPr algn="ctr"/>
-            <a:r>
-              <a:rPr lang="hu-AE" dirty="0">
-                <a:solidFill>
-                  <a:sysClr val="windowText" lastClr="000000"/>
-                </a:solidFill>
-              </a:rPr>
-              <a:t>NYUAD network</a:t>
-            </a:r>
-          </a:p>
-          <a:p>
-            <a:pPr algn="ctr"/>
-            <a:r>
-              <a:rPr lang="hu-AE" dirty="0">
-                <a:solidFill>
-                  <a:sysClr val="windowText" lastClr="000000"/>
-                </a:solidFill>
-              </a:rPr>
-              <a:t>(gray cables)</a:t>
-            </a:r>
-          </a:p>
-        </p:txBody>
-      </p:sp>
-      <p:pic>
-        <p:nvPicPr>
-          <p:cNvPr id="11" name="Kép 10">
-            <a:extLst>
-              <a:ext uri="{FF2B5EF4-FFF2-40B4-BE49-F238E27FC236}">
-                <a16:creationId xmlns:a16="http://schemas.microsoft.com/office/drawing/2014/main" id="{151041AE-1C29-5349-FF7F-1B490D23861B}"/>
-              </a:ext>
-            </a:extLst>
-          </p:cNvPr>
-          <p:cNvPicPr>
-            <a:picLocks noChangeAspect="1"/>
-          </p:cNvPicPr>
-          <p:nvPr/>
-        </p:nvPicPr>
-        <p:blipFill>
-          <a:blip r:embed="rId9"/>
-          <a:stretch>
-            <a:fillRect/>
-          </a:stretch>
-        </p:blipFill>
-        <p:spPr>
-          <a:xfrm>
-            <a:off x="6961402" y="2828269"/>
-            <a:ext cx="736100" cy="736100"/>
-          </a:xfrm>
-          <a:prstGeom prst="rect">
-            <a:avLst/>
-          </a:prstGeom>
-        </p:spPr>
-      </p:pic>
-      <p:sp>
-        <p:nvSpPr>
-          <p:cNvPr id="13" name="Szövegdoboz 12">
-            <a:extLst>
-              <a:ext uri="{FF2B5EF4-FFF2-40B4-BE49-F238E27FC236}">
-                <a16:creationId xmlns:a16="http://schemas.microsoft.com/office/drawing/2014/main" id="{4776D755-2F21-F3C6-A3AD-239FF7A27CD0}"/>
-              </a:ext>
-            </a:extLst>
-          </p:cNvPr>
-          <p:cNvSpPr txBox="1"/>
-          <p:nvPr/>
-        </p:nvSpPr>
-        <p:spPr>
-          <a:xfrm>
-            <a:off x="5453951" y="2913261"/>
-            <a:ext cx="1678666" cy="707886"/>
-          </a:xfrm>
-          <a:prstGeom prst="rect">
-            <a:avLst/>
-          </a:prstGeom>
-          <a:noFill/>
-        </p:spPr>
-        <p:txBody>
-          <a:bodyPr wrap="none" rtlCol="0">
-            <a:spAutoFit/>
-          </a:bodyPr>
-          <a:lstStyle/>
-          <a:p>
-            <a:pPr algn="r"/>
-            <a:r>
-              <a:rPr lang="hu-AE" sz="1100" dirty="0"/>
-              <a:t>Universal Robots UR3e</a:t>
-            </a:r>
-            <a:br>
-              <a:rPr lang="hu-AE" sz="1100" dirty="0"/>
-            </a:br>
-            <a:r>
-              <a:rPr lang="hu-AE" sz="1100" dirty="0"/>
-              <a:t>Robotic arm, direct access</a:t>
-            </a:r>
-          </a:p>
-          <a:p>
-            <a:pPr algn="r"/>
-            <a:r>
-              <a:rPr lang="hu-AE" dirty="0"/>
-              <a:t>192.168.42.10</a:t>
-            </a:r>
-          </a:p>
-        </p:txBody>
-      </p:sp>
-      <p:cxnSp>
-        <p:nvCxnSpPr>
-          <p:cNvPr id="21" name="Egyenes összekötő 20">
-            <a:extLst>
-              <a:ext uri="{FF2B5EF4-FFF2-40B4-BE49-F238E27FC236}">
-                <a16:creationId xmlns:a16="http://schemas.microsoft.com/office/drawing/2014/main" id="{1E8E8C58-849A-2601-A02B-CC6AE70C5CD4}"/>
-              </a:ext>
-            </a:extLst>
-          </p:cNvPr>
-          <p:cNvCxnSpPr>
-            <a:cxnSpLocks/>
-          </p:cNvCxnSpPr>
-          <p:nvPr/>
-        </p:nvCxnSpPr>
-        <p:spPr>
-          <a:xfrm flipV="1">
-            <a:off x="7459721" y="2604861"/>
-            <a:ext cx="2185320" cy="805302"/>
-          </a:xfrm>
-          <a:prstGeom prst="line">
-            <a:avLst/>
-          </a:prstGeom>
-          <a:ln w="12700">
-            <a:solidFill>
-              <a:schemeClr val="tx1"/>
-            </a:solidFill>
-          </a:ln>
-        </p:spPr>
-        <p:style>
-          <a:lnRef idx="1">
-            <a:schemeClr val="accent1"/>
-          </a:lnRef>
-          <a:fillRef idx="0">
-            <a:schemeClr val="accent1"/>
-          </a:fillRef>
-          <a:effectRef idx="0">
-            <a:schemeClr val="accent1"/>
-          </a:effectRef>
-          <a:fontRef idx="minor">
-            <a:schemeClr val="tx1"/>
-          </a:fontRef>
-        </p:style>
-      </p:cxnSp>
+          <a:p>
+            <a:endParaRPr lang="hu-AE" dirty="0"/>
+          </a:p>
+        </p:txBody>
+      </p:sp>
     </p:spTree>
     <p:extLst>
       <p:ext uri="{BB962C8B-B14F-4D97-AF65-F5344CB8AC3E}">

</xml_diff>

<commit_message>
Local IP address typos
</commit_message>
<xml_diff>
--- a/img/volciclab_network.pptx
+++ b/img/volciclab_network.pptx
@@ -261,7 +261,7 @@
           <a:p>
             <a:fld id="{BCBE9AB7-E685-784A-BE37-C84773150D37}" type="datetimeFigureOut">
               <a:rPr lang="hu-AE" smtClean="0"/>
-              <a:t>29/1/2024</a:t>
+              <a:t>04/02/2024</a:t>
             </a:fld>
             <a:endParaRPr lang="hu-AE"/>
           </a:p>
@@ -461,7 +461,7 @@
           <a:p>
             <a:fld id="{BCBE9AB7-E685-784A-BE37-C84773150D37}" type="datetimeFigureOut">
               <a:rPr lang="hu-AE" smtClean="0"/>
-              <a:t>29/1/2024</a:t>
+              <a:t>04/02/2024</a:t>
             </a:fld>
             <a:endParaRPr lang="hu-AE"/>
           </a:p>
@@ -671,7 +671,7 @@
           <a:p>
             <a:fld id="{BCBE9AB7-E685-784A-BE37-C84773150D37}" type="datetimeFigureOut">
               <a:rPr lang="hu-AE" smtClean="0"/>
-              <a:t>29/1/2024</a:t>
+              <a:t>04/02/2024</a:t>
             </a:fld>
             <a:endParaRPr lang="hu-AE"/>
           </a:p>
@@ -871,7 +871,7 @@
           <a:p>
             <a:fld id="{BCBE9AB7-E685-784A-BE37-C84773150D37}" type="datetimeFigureOut">
               <a:rPr lang="hu-AE" smtClean="0"/>
-              <a:t>29/1/2024</a:t>
+              <a:t>04/02/2024</a:t>
             </a:fld>
             <a:endParaRPr lang="hu-AE"/>
           </a:p>
@@ -1147,7 +1147,7 @@
           <a:p>
             <a:fld id="{BCBE9AB7-E685-784A-BE37-C84773150D37}" type="datetimeFigureOut">
               <a:rPr lang="hu-AE" smtClean="0"/>
-              <a:t>29/1/2024</a:t>
+              <a:t>04/02/2024</a:t>
             </a:fld>
             <a:endParaRPr lang="hu-AE"/>
           </a:p>
@@ -1415,7 +1415,7 @@
           <a:p>
             <a:fld id="{BCBE9AB7-E685-784A-BE37-C84773150D37}" type="datetimeFigureOut">
               <a:rPr lang="hu-AE" smtClean="0"/>
-              <a:t>29/1/2024</a:t>
+              <a:t>04/02/2024</a:t>
             </a:fld>
             <a:endParaRPr lang="hu-AE"/>
           </a:p>
@@ -1830,7 +1830,7 @@
           <a:p>
             <a:fld id="{BCBE9AB7-E685-784A-BE37-C84773150D37}" type="datetimeFigureOut">
               <a:rPr lang="hu-AE" smtClean="0"/>
-              <a:t>29/1/2024</a:t>
+              <a:t>04/02/2024</a:t>
             </a:fld>
             <a:endParaRPr lang="hu-AE"/>
           </a:p>
@@ -1972,7 +1972,7 @@
           <a:p>
             <a:fld id="{BCBE9AB7-E685-784A-BE37-C84773150D37}" type="datetimeFigureOut">
               <a:rPr lang="hu-AE" smtClean="0"/>
-              <a:t>29/1/2024</a:t>
+              <a:t>04/02/2024</a:t>
             </a:fld>
             <a:endParaRPr lang="hu-AE"/>
           </a:p>
@@ -2085,7 +2085,7 @@
           <a:p>
             <a:fld id="{BCBE9AB7-E685-784A-BE37-C84773150D37}" type="datetimeFigureOut">
               <a:rPr lang="hu-AE" smtClean="0"/>
-              <a:t>29/1/2024</a:t>
+              <a:t>04/02/2024</a:t>
             </a:fld>
             <a:endParaRPr lang="hu-AE"/>
           </a:p>
@@ -2398,7 +2398,7 @@
           <a:p>
             <a:fld id="{BCBE9AB7-E685-784A-BE37-C84773150D37}" type="datetimeFigureOut">
               <a:rPr lang="hu-AE" smtClean="0"/>
-              <a:t>29/1/2024</a:t>
+              <a:t>04/02/2024</a:t>
             </a:fld>
             <a:endParaRPr lang="hu-AE"/>
           </a:p>
@@ -2687,7 +2687,7 @@
           <a:p>
             <a:fld id="{BCBE9AB7-E685-784A-BE37-C84773150D37}" type="datetimeFigureOut">
               <a:rPr lang="hu-AE" smtClean="0"/>
-              <a:t>29/1/2024</a:t>
+              <a:t>04/02/2024</a:t>
             </a:fld>
             <a:endParaRPr lang="hu-AE"/>
           </a:p>
@@ -2930,7 +2930,7 @@
           <a:p>
             <a:fld id="{BCBE9AB7-E685-784A-BE37-C84773150D37}" type="datetimeFigureOut">
               <a:rPr lang="hu-AE" smtClean="0"/>
-              <a:t>29/1/2024</a:t>
+              <a:t>04/02/2024</a:t>
             </a:fld>
             <a:endParaRPr lang="hu-AE"/>
           </a:p>
@@ -3526,8 +3526,13 @@
             <a:p>
               <a:r>
                 <a:rPr lang="hu-AE" dirty="0"/>
-                <a:t>192.168.42.5</a:t>
+                <a:t>192.168.42.</a:t>
               </a:r>
+              <a:r>
+                <a:rPr lang="hu-HU" dirty="0"/>
+                <a:t>6</a:t>
+              </a:r>
+              <a:endParaRPr lang="hu-AE" dirty="0"/>
             </a:p>
             <a:p>
               <a:endParaRPr lang="hu-AE" dirty="0"/>
@@ -4543,8 +4548,13 @@
             <a:p>
               <a:r>
                 <a:rPr lang="hu-AE" dirty="0"/>
-                <a:t>192.168.42.6</a:t>
+                <a:t>192.168.42.</a:t>
               </a:r>
+              <a:r>
+                <a:rPr lang="hu-HU" dirty="0"/>
+                <a:t>7</a:t>
+              </a:r>
+              <a:endParaRPr lang="hu-AE" dirty="0"/>
             </a:p>
             <a:p>
               <a:endParaRPr lang="hu-AE" dirty="0"/>
@@ -4745,8 +4755,8 @@
         </p:nvCxnSpPr>
         <p:spPr>
           <a:xfrm flipH="1" flipV="1">
-            <a:off x="6536936" y="1810633"/>
-            <a:ext cx="3343522" cy="670573"/>
+            <a:off x="6052406" y="1681155"/>
+            <a:ext cx="3828052" cy="800051"/>
           </a:xfrm>
           <a:prstGeom prst="line">
             <a:avLst/>
@@ -5310,7 +5320,7 @@
         </p:nvSpPr>
         <p:spPr>
           <a:xfrm>
-            <a:off x="5008986" y="1519064"/>
+            <a:off x="4700229" y="1497834"/>
             <a:ext cx="1410964" cy="707886"/>
           </a:xfrm>
           <a:prstGeom prst="rect">
@@ -5465,49 +5475,6 @@
               <a:t>shown</a:t>
             </a:r>
             <a:endParaRPr lang="hu-AE" dirty="0"/>
-          </a:p>
-        </p:txBody>
-      </p:sp>
-      <p:sp>
-        <p:nvSpPr>
-          <p:cNvPr id="26" name="Szövegdoboz 25">
-            <a:extLst>
-              <a:ext uri="{FF2B5EF4-FFF2-40B4-BE49-F238E27FC236}">
-                <a16:creationId xmlns:a16="http://schemas.microsoft.com/office/drawing/2014/main" id="{3D883552-5148-2347-8ED9-2C811B0C94CE}"/>
-              </a:ext>
-            </a:extLst>
-          </p:cNvPr>
-          <p:cNvSpPr txBox="1"/>
-          <p:nvPr/>
-        </p:nvSpPr>
-        <p:spPr>
-          <a:xfrm>
-            <a:off x="3588871" y="3428559"/>
-            <a:ext cx="1579278" cy="430887"/>
-          </a:xfrm>
-          <a:prstGeom prst="rect">
-            <a:avLst/>
-          </a:prstGeom>
-          <a:noFill/>
-        </p:spPr>
-        <p:txBody>
-          <a:bodyPr wrap="none" rtlCol="0">
-            <a:spAutoFit/>
-          </a:bodyPr>
-          <a:lstStyle/>
-          <a:p>
-            <a:pPr algn="ctr"/>
-            <a:r>
-              <a:rPr lang="hu-AE" sz="1100" dirty="0"/>
-              <a:t>OptiTrack computer</a:t>
-            </a:r>
-          </a:p>
-          <a:p>
-            <a:pPr algn="ctr"/>
-            <a:r>
-              <a:rPr lang="hu-AE" sz="1100" dirty="0"/>
-              <a:t>Camera network (DHCP)</a:t>
-            </a:r>
           </a:p>
         </p:txBody>
       </p:sp>

</xml_diff>